<commit_message>
Added notes on docker machine certifcate authentication
</commit_message>
<xml_diff>
--- a/DockerSeries/Part1-Fundamentals/Docker Fundamentals.pptx
+++ b/DockerSeries/Part1-Fundamentals/Docker Fundamentals.pptx
@@ -7277,6 +7277,447 @@
           <a:bodyPr/>
           <a:lstStyle/>
           <a:p>
+            <a:r>
+              <a:rPr lang="en-US" sz="1200" b="0" i="0" u="none" strike="noStrike" kern="1200" dirty="0">
+                <a:solidFill>
+                  <a:schemeClr val="tx1"/>
+                </a:solidFill>
+                <a:effectLst/>
+                <a:latin typeface="+mn-lt"/>
+                <a:ea typeface="+mn-ea"/>
+                <a:cs typeface="+mn-cs"/>
+              </a:rPr>
+              <a:t>Docker-Machine is a host for running containers. Docker machines can be created using different drivers Ex: VirtualBox, AWS, Azure </a:t>
+            </a:r>
+            <a:r>
+              <a:rPr lang="en-US" sz="1200" b="0" i="0" u="none" strike="noStrike" kern="1200" dirty="0" err="1">
+                <a:solidFill>
+                  <a:schemeClr val="tx1"/>
+                </a:solidFill>
+                <a:effectLst/>
+                <a:latin typeface="+mn-lt"/>
+                <a:ea typeface="+mn-ea"/>
+                <a:cs typeface="+mn-cs"/>
+              </a:rPr>
+              <a:t>etc</a:t>
+            </a:r>
+            <a:r>
+              <a:rPr lang="en-US" sz="1200" b="0" i="0" u="none" strike="noStrike" kern="1200" dirty="0">
+                <a:solidFill>
+                  <a:schemeClr val="tx1"/>
+                </a:solidFill>
+                <a:effectLst/>
+                <a:latin typeface="+mn-lt"/>
+                <a:ea typeface="+mn-ea"/>
+                <a:cs typeface="+mn-cs"/>
+              </a:rPr>
+              <a:t>,</a:t>
+            </a:r>
+          </a:p>
+          <a:p>
+            <a:endParaRPr lang="en-US" sz="1200" b="0" i="0" u="none" strike="noStrike" kern="1200" dirty="0">
+              <a:solidFill>
+                <a:schemeClr val="tx1"/>
+              </a:solidFill>
+              <a:effectLst/>
+              <a:latin typeface="+mn-lt"/>
+              <a:ea typeface="+mn-ea"/>
+              <a:cs typeface="+mn-cs"/>
+            </a:endParaRPr>
+          </a:p>
+          <a:p>
+            <a:r>
+              <a:rPr lang="en-US" sz="1200" b="0" i="0" u="none" strike="noStrike" kern="1200" dirty="0">
+                <a:solidFill>
+                  <a:schemeClr val="tx1"/>
+                </a:solidFill>
+                <a:effectLst/>
+                <a:latin typeface="+mn-lt"/>
+                <a:ea typeface="+mn-ea"/>
+                <a:cs typeface="+mn-cs"/>
+              </a:rPr>
+              <a:t>Docker Machine hosts the docker daemon that exposes a rest API to listen for incoming commands.</a:t>
+            </a:r>
+          </a:p>
+          <a:p>
+            <a:r>
+              <a:rPr lang="en-US" sz="1200" b="0" i="0" u="none" strike="noStrike" kern="1200" dirty="0">
+                <a:solidFill>
+                  <a:schemeClr val="tx1"/>
+                </a:solidFill>
+                <a:effectLst/>
+                <a:latin typeface="+mn-lt"/>
+                <a:ea typeface="+mn-ea"/>
+                <a:cs typeface="+mn-cs"/>
+              </a:rPr>
+              <a:t>Docker client can then be pointed to appropriate docker machine and then issue commands that will be executed via docker-machine’s docker engine.</a:t>
+            </a:r>
+          </a:p>
+          <a:p>
+            <a:endParaRPr lang="en-US" sz="1200" b="0" i="0" u="none" strike="noStrike" kern="1200" dirty="0">
+              <a:solidFill>
+                <a:schemeClr val="tx1"/>
+              </a:solidFill>
+              <a:effectLst/>
+              <a:latin typeface="+mn-lt"/>
+              <a:ea typeface="+mn-ea"/>
+              <a:cs typeface="+mn-cs"/>
+            </a:endParaRPr>
+          </a:p>
+          <a:p>
+            <a:endParaRPr lang="en-US" sz="1200" b="0" i="0" u="none" strike="noStrike" kern="1200" dirty="0">
+              <a:solidFill>
+                <a:schemeClr val="tx1"/>
+              </a:solidFill>
+              <a:effectLst/>
+              <a:latin typeface="+mn-lt"/>
+              <a:ea typeface="+mn-ea"/>
+              <a:cs typeface="+mn-cs"/>
+            </a:endParaRPr>
+          </a:p>
+          <a:p>
+            <a:r>
+              <a:rPr lang="en-US" sz="1200" b="0" i="0" u="none" strike="noStrike" kern="1200" dirty="0">
+                <a:solidFill>
+                  <a:schemeClr val="tx1"/>
+                </a:solidFill>
+                <a:effectLst/>
+                <a:latin typeface="+mn-lt"/>
+                <a:ea typeface="+mn-ea"/>
+                <a:cs typeface="+mn-cs"/>
+              </a:rPr>
+              <a:t>Protect the Docker daemon socket</a:t>
+            </a:r>
+          </a:p>
+          <a:p>
+            <a:r>
+              <a:rPr lang="en-US" sz="1200" b="0" i="0" u="none" strike="noStrike" kern="1200" dirty="0">
+                <a:solidFill>
+                  <a:schemeClr val="tx1"/>
+                </a:solidFill>
+                <a:effectLst/>
+                <a:latin typeface="+mn-lt"/>
+                <a:ea typeface="+mn-ea"/>
+                <a:cs typeface="+mn-cs"/>
+              </a:rPr>
+              <a:t>By default, Docker runs through a non-networked UNIX socket. It can also optionally communicate using an HTTP socket.</a:t>
+            </a:r>
+          </a:p>
+          <a:p>
+            <a:r>
+              <a:rPr lang="en-US" sz="1200" b="0" i="0" u="none" strike="noStrike" kern="1200" dirty="0">
+                <a:solidFill>
+                  <a:schemeClr val="tx1"/>
+                </a:solidFill>
+                <a:effectLst/>
+                <a:latin typeface="+mn-lt"/>
+                <a:ea typeface="+mn-ea"/>
+                <a:cs typeface="+mn-cs"/>
+              </a:rPr>
+              <a:t>If you need Docker to be reachable through the network in a safe manner, you can enable TLS by specifying the </a:t>
+            </a:r>
+            <a:r>
+              <a:rPr lang="en-US" sz="1200" b="0" i="0" u="none" strike="noStrike" kern="1200" dirty="0" err="1">
+                <a:solidFill>
+                  <a:schemeClr val="tx1"/>
+                </a:solidFill>
+                <a:effectLst/>
+                <a:latin typeface="+mn-lt"/>
+                <a:ea typeface="+mn-ea"/>
+                <a:cs typeface="+mn-cs"/>
+              </a:rPr>
+              <a:t>tlsverify</a:t>
+            </a:r>
+            <a:r>
+              <a:rPr lang="en-US" sz="1200" b="0" i="0" u="none" strike="noStrike" kern="1200" dirty="0">
+                <a:solidFill>
+                  <a:schemeClr val="tx1"/>
+                </a:solidFill>
+                <a:effectLst/>
+                <a:latin typeface="+mn-lt"/>
+                <a:ea typeface="+mn-ea"/>
+                <a:cs typeface="+mn-cs"/>
+              </a:rPr>
+              <a:t> flag and pointing Docker’s </a:t>
+            </a:r>
+            <a:r>
+              <a:rPr lang="en-US" sz="1200" b="0" i="0" u="none" strike="noStrike" kern="1200" dirty="0" err="1">
+                <a:solidFill>
+                  <a:schemeClr val="tx1"/>
+                </a:solidFill>
+                <a:effectLst/>
+                <a:latin typeface="+mn-lt"/>
+                <a:ea typeface="+mn-ea"/>
+                <a:cs typeface="+mn-cs"/>
+              </a:rPr>
+              <a:t>tlscacert</a:t>
+            </a:r>
+            <a:r>
+              <a:rPr lang="en-US" sz="1200" b="0" i="0" u="none" strike="noStrike" kern="1200" dirty="0">
+                <a:solidFill>
+                  <a:schemeClr val="tx1"/>
+                </a:solidFill>
+                <a:effectLst/>
+                <a:latin typeface="+mn-lt"/>
+                <a:ea typeface="+mn-ea"/>
+                <a:cs typeface="+mn-cs"/>
+              </a:rPr>
+              <a:t> flag to a trusted CA certificate.</a:t>
+            </a:r>
+          </a:p>
+          <a:p>
+            <a:r>
+              <a:rPr lang="en-US" sz="1200" b="0" i="0" u="none" strike="noStrike" kern="1200" dirty="0">
+                <a:solidFill>
+                  <a:schemeClr val="tx1"/>
+                </a:solidFill>
+                <a:effectLst/>
+                <a:latin typeface="+mn-lt"/>
+                <a:ea typeface="+mn-ea"/>
+                <a:cs typeface="+mn-cs"/>
+              </a:rPr>
+              <a:t>In the daemon mode, it only allows connections from clients authenticated by a certificate signed by that CA. In the client mode, it only connects to servers with a certificate signed by that CA.</a:t>
+            </a:r>
+          </a:p>
+          <a:p>
+            <a:endParaRPr lang="en-GB" dirty="0"/>
+          </a:p>
+          <a:p>
+            <a:r>
+              <a:rPr lang="en-GB" dirty="0"/>
+              <a:t>Protect Registry with Certificates</a:t>
+            </a:r>
+          </a:p>
+          <a:p>
+            <a:r>
+              <a:rPr lang="en-US" sz="1200" b="0" i="0" u="none" strike="noStrike" kern="1200" dirty="0">
+                <a:solidFill>
+                  <a:schemeClr val="tx1"/>
+                </a:solidFill>
+                <a:effectLst/>
+                <a:latin typeface="+mn-lt"/>
+                <a:ea typeface="+mn-ea"/>
+                <a:cs typeface="+mn-cs"/>
+              </a:rPr>
+              <a:t>A custom certificate is configured by creating a directory under </a:t>
+            </a:r>
+            <a:r>
+              <a:rPr lang="en-US" dirty="0"/>
+              <a:t>/</a:t>
+            </a:r>
+            <a:r>
+              <a:rPr lang="en-US" dirty="0" err="1"/>
+              <a:t>etc</a:t>
+            </a:r>
+            <a:r>
+              <a:rPr lang="en-US" dirty="0"/>
+              <a:t>/docker/</a:t>
+            </a:r>
+            <a:r>
+              <a:rPr lang="en-US" dirty="0" err="1"/>
+              <a:t>certs.d</a:t>
+            </a:r>
+            <a:r>
+              <a:rPr lang="en-US" sz="1200" b="0" i="0" u="none" strike="noStrike" kern="1200" dirty="0">
+                <a:solidFill>
+                  <a:schemeClr val="tx1"/>
+                </a:solidFill>
+                <a:effectLst/>
+                <a:latin typeface="+mn-lt"/>
+                <a:ea typeface="+mn-ea"/>
+                <a:cs typeface="+mn-cs"/>
+              </a:rPr>
+              <a:t> using the same name as the registry’s hostname, such as </a:t>
+            </a:r>
+            <a:r>
+              <a:rPr lang="en-US" dirty="0"/>
+              <a:t>localhost</a:t>
+            </a:r>
+            <a:r>
+              <a:rPr lang="en-US" sz="1200" b="0" i="0" u="none" strike="noStrike" kern="1200" dirty="0">
+                <a:solidFill>
+                  <a:schemeClr val="tx1"/>
+                </a:solidFill>
+                <a:effectLst/>
+                <a:latin typeface="+mn-lt"/>
+                <a:ea typeface="+mn-ea"/>
+                <a:cs typeface="+mn-cs"/>
+              </a:rPr>
+              <a:t>. All </a:t>
+            </a:r>
+            <a:r>
+              <a:rPr lang="en-US" dirty="0"/>
+              <a:t>*.</a:t>
+            </a:r>
+            <a:r>
+              <a:rPr lang="en-US" dirty="0" err="1"/>
+              <a:t>crt</a:t>
+            </a:r>
+            <a:r>
+              <a:rPr lang="en-US" sz="1200" b="0" i="0" u="none" strike="noStrike" kern="1200" dirty="0">
+                <a:solidFill>
+                  <a:schemeClr val="tx1"/>
+                </a:solidFill>
+                <a:effectLst/>
+                <a:latin typeface="+mn-lt"/>
+                <a:ea typeface="+mn-ea"/>
+                <a:cs typeface="+mn-cs"/>
+              </a:rPr>
+              <a:t> files are added to this directory as CA roots.</a:t>
+            </a:r>
+            <a:endParaRPr lang="en-GB" dirty="0"/>
+          </a:p>
+          <a:p>
+            <a:r>
+              <a:rPr lang="en-US" sz="1200" b="0" i="0" u="none" strike="noStrike" kern="1200" dirty="0">
+                <a:solidFill>
+                  <a:schemeClr val="tx1"/>
+                </a:solidFill>
+                <a:effectLst/>
+                <a:latin typeface="+mn-lt"/>
+                <a:ea typeface="+mn-ea"/>
+                <a:cs typeface="+mn-cs"/>
+              </a:rPr>
+              <a:t>The presence of one or more </a:t>
+            </a:r>
+            <a:r>
+              <a:rPr lang="en-US" dirty="0"/>
+              <a:t>&lt;filename&gt;.key/cert</a:t>
+            </a:r>
+            <a:r>
+              <a:rPr lang="en-US" sz="1200" b="0" i="0" u="none" strike="noStrike" kern="1200" dirty="0">
+                <a:solidFill>
+                  <a:schemeClr val="tx1"/>
+                </a:solidFill>
+                <a:effectLst/>
+                <a:latin typeface="+mn-lt"/>
+                <a:ea typeface="+mn-ea"/>
+                <a:cs typeface="+mn-cs"/>
+              </a:rPr>
+              <a:t> pairs indicates to Docker that there are custom certificates required for access to the desired repository.</a:t>
+            </a:r>
+          </a:p>
+          <a:p>
+            <a:r>
+              <a:rPr lang="en-US" sz="1200" i="0" u="none" strike="noStrike" kern="1200" dirty="0">
+                <a:solidFill>
+                  <a:schemeClr val="tx1"/>
+                </a:solidFill>
+                <a:effectLst/>
+                <a:latin typeface="+mn-lt"/>
+                <a:ea typeface="+mn-ea"/>
+                <a:cs typeface="+mn-cs"/>
+              </a:rPr>
+              <a:t>If multiple certificates exist, each is tried in alphabetical order. If there is a 4xx-level or 5xx-level authentication error, Docker continues to try with the next certificate</a:t>
+            </a:r>
+          </a:p>
+          <a:p>
+            <a:endParaRPr lang="en-US" sz="1200" i="0" u="none" strike="noStrike" kern="1200" dirty="0">
+              <a:solidFill>
+                <a:schemeClr val="tx1"/>
+              </a:solidFill>
+              <a:effectLst/>
+              <a:latin typeface="+mn-lt"/>
+              <a:ea typeface="+mn-ea"/>
+              <a:cs typeface="+mn-cs"/>
+            </a:endParaRPr>
+          </a:p>
+          <a:p>
+            <a:endParaRPr lang="en-US" sz="1200" i="0" u="none" strike="noStrike" kern="1200" dirty="0">
+              <a:solidFill>
+                <a:schemeClr val="tx1"/>
+              </a:solidFill>
+              <a:effectLst/>
+              <a:latin typeface="+mn-lt"/>
+              <a:ea typeface="+mn-ea"/>
+              <a:cs typeface="+mn-cs"/>
+            </a:endParaRPr>
+          </a:p>
+          <a:p>
+            <a:r>
+              <a:rPr lang="en-US" sz="1200" b="0" i="0" u="none" strike="noStrike" kern="1200" dirty="0">
+                <a:solidFill>
+                  <a:schemeClr val="tx1"/>
+                </a:solidFill>
+                <a:effectLst/>
+                <a:latin typeface="+mn-lt"/>
+                <a:ea typeface="+mn-ea"/>
+                <a:cs typeface="+mn-cs"/>
+              </a:rPr>
+              <a:t>The Docker daemon interprets </a:t>
+            </a:r>
+            <a:r>
+              <a:rPr lang="en-US" dirty="0"/>
+              <a:t>.</a:t>
+            </a:r>
+            <a:r>
+              <a:rPr lang="en-US" dirty="0" err="1"/>
+              <a:t>crt</a:t>
+            </a:r>
+            <a:r>
+              <a:rPr lang="en-US" sz="1200" b="0" i="0" u="none" strike="noStrike" kern="1200" dirty="0">
+                <a:solidFill>
+                  <a:schemeClr val="tx1"/>
+                </a:solidFill>
+                <a:effectLst/>
+                <a:latin typeface="+mn-lt"/>
+                <a:ea typeface="+mn-ea"/>
+                <a:cs typeface="+mn-cs"/>
+              </a:rPr>
+              <a:t> files as CA certificates and </a:t>
+            </a:r>
+            <a:r>
+              <a:rPr lang="en-US" dirty="0"/>
+              <a:t>.cert</a:t>
+            </a:r>
+            <a:r>
+              <a:rPr lang="en-US" sz="1200" b="0" i="0" u="none" strike="noStrike" kern="1200" dirty="0">
+                <a:solidFill>
+                  <a:schemeClr val="tx1"/>
+                </a:solidFill>
+                <a:effectLst/>
+                <a:latin typeface="+mn-lt"/>
+                <a:ea typeface="+mn-ea"/>
+                <a:cs typeface="+mn-cs"/>
+              </a:rPr>
+              <a:t> files as client certificates. If a CA certificate is accidentally given the extension </a:t>
+            </a:r>
+            <a:r>
+              <a:rPr lang="en-US" dirty="0"/>
+              <a:t>.cert</a:t>
+            </a:r>
+            <a:r>
+              <a:rPr lang="en-US" sz="1200" b="0" i="0" u="none" strike="noStrike" kern="1200" dirty="0">
+                <a:solidFill>
+                  <a:schemeClr val="tx1"/>
+                </a:solidFill>
+                <a:effectLst/>
+                <a:latin typeface="+mn-lt"/>
+                <a:ea typeface="+mn-ea"/>
+                <a:cs typeface="+mn-cs"/>
+              </a:rPr>
+              <a:t> instead of the correct </a:t>
+            </a:r>
+            <a:r>
+              <a:rPr lang="en-US" dirty="0"/>
+              <a:t>.</a:t>
+            </a:r>
+            <a:r>
+              <a:rPr lang="en-US" dirty="0" err="1"/>
+              <a:t>crt</a:t>
+            </a:r>
+            <a:r>
+              <a:rPr lang="en-US" sz="1200" b="0" i="0" u="none" strike="noStrike" kern="1200" dirty="0">
+                <a:solidFill>
+                  <a:schemeClr val="tx1"/>
+                </a:solidFill>
+                <a:effectLst/>
+                <a:latin typeface="+mn-lt"/>
+                <a:ea typeface="+mn-ea"/>
+                <a:cs typeface="+mn-cs"/>
+              </a:rPr>
+              <a:t> extension, the Docker daemon logs the following error message</a:t>
+            </a:r>
             <a:endParaRPr lang="en-GB" dirty="0"/>
           </a:p>
         </p:txBody>
@@ -14200,7 +14641,7 @@
           <a:graphicData uri="http://schemas.openxmlformats.org/presentationml/2006/ole">
             <mc:AlternateContent xmlns:mc="http://schemas.openxmlformats.org/markup-compatibility/2006">
               <mc:Choice xmlns:v="urn:schemas-microsoft-com:vml" Requires="v">
-                <p:oleObj spid="_x0000_s1094" name="Bitmap Image" r:id="rId5" imgW="5734080" imgH="5276880" progId="Paint.Picture">
+                <p:oleObj spid="_x0000_s1116" name="Bitmap Image" r:id="rId5" imgW="5734080" imgH="5276880" progId="Paint.Picture">
                   <p:embed/>
                 </p:oleObj>
               </mc:Choice>
@@ -19138,8 +19579,8 @@
         </p:nvSpPr>
         <p:spPr>
           <a:xfrm>
-            <a:off x="551933" y="2563172"/>
-            <a:ext cx="10324614" cy="646331"/>
+            <a:off x="551934" y="2275181"/>
+            <a:ext cx="10324614" cy="1754326"/>
           </a:xfrm>
           <a:prstGeom prst="rect">
             <a:avLst/>
@@ -19157,10 +19598,61 @@
             </a:endParaRPr>
           </a:p>
           <a:p>
+            <a:r>
+              <a:rPr lang="en-US" dirty="0"/>
+              <a:t>Certificates can be used for following:</a:t>
+            </a:r>
+          </a:p>
+          <a:p>
             <a:endParaRPr lang="en-US" dirty="0"/>
           </a:p>
+          <a:p>
+            <a:r>
+              <a:rPr lang="en-US" dirty="0"/>
+              <a:t>Establish secure communication between docker client / docker daemon</a:t>
+            </a:r>
+          </a:p>
+          <a:p>
+            <a:r>
+              <a:rPr lang="en-US" dirty="0"/>
+              <a:t>Authenticate and access protected Repositories.</a:t>
+            </a:r>
+          </a:p>
+          <a:p>
+            <a:endParaRPr lang="en-US" dirty="0"/>
+          </a:p>
         </p:txBody>
       </p:sp>
+      <p:pic>
+        <p:nvPicPr>
+          <p:cNvPr id="6" name="Picture 5">
+            <a:extLst>
+              <a:ext uri="{FF2B5EF4-FFF2-40B4-BE49-F238E27FC236}">
+                <a16:creationId xmlns:a16="http://schemas.microsoft.com/office/drawing/2014/main" id="{36691885-3B0F-4930-8CB9-86E3FDE323F0}"/>
+              </a:ext>
+            </a:extLst>
+          </p:cNvPr>
+          <p:cNvPicPr>
+            <a:picLocks noChangeAspect="1"/>
+          </p:cNvPicPr>
+          <p:nvPr/>
+        </p:nvPicPr>
+        <p:blipFill>
+          <a:blip r:embed="rId5"/>
+          <a:stretch>
+            <a:fillRect/>
+          </a:stretch>
+        </p:blipFill>
+        <p:spPr>
+          <a:xfrm>
+            <a:off x="0" y="4080819"/>
+            <a:ext cx="12191999" cy="2057400"/>
+          </a:xfrm>
+          <a:prstGeom prst="rect">
+            <a:avLst/>
+          </a:prstGeom>
+        </p:spPr>
+      </p:pic>
     </p:spTree>
     <p:extLst>
       <p:ext uri="{BB962C8B-B14F-4D97-AF65-F5344CB8AC3E}">

</xml_diff>

<commit_message>
Added slide for Oracle Containers
</commit_message>
<xml_diff>
--- a/DockerSeries/Part1-Fundamentals/Docker Fundamentals.pptx
+++ b/DockerSeries/Part1-Fundamentals/Docker Fundamentals.pptx
@@ -5,7 +5,7 @@
     <p:sldMasterId id="2147483672" r:id="rId1"/>
   </p:sldMasterIdLst>
   <p:notesMasterIdLst>
-    <p:notesMasterId r:id="rId24"/>
+    <p:notesMasterId r:id="rId25"/>
   </p:notesMasterIdLst>
   <p:sldIdLst>
     <p:sldId id="256" r:id="rId2"/>
@@ -30,6 +30,7 @@
     <p:sldId id="260" r:id="rId21"/>
     <p:sldId id="259" r:id="rId22"/>
     <p:sldId id="272" r:id="rId23"/>
+    <p:sldId id="279" r:id="rId24"/>
   </p:sldIdLst>
   <p:sldSz cx="12192000" cy="6858000"/>
   <p:notesSz cx="6858000" cy="9144000"/>
@@ -3952,7 +3953,7 @@
           <a:p>
             <a:fld id="{70679F3D-1AF7-4C15-803B-D0ED7BCC2C35}" type="datetimeFigureOut">
               <a:rPr lang="en-US" smtClean="0"/>
-              <a:t>2/20/2019</a:t>
+              <a:t>2/27/2019</a:t>
             </a:fld>
             <a:endParaRPr lang="en-US"/>
           </a:p>
@@ -6132,6 +6133,90 @@
 </p:notes>
 </file>
 
+<file path=ppt/notesSlides/notesSlide21.xml><?xml version="1.0" encoding="utf-8"?>
+<p:notes xmlns:a="http://schemas.openxmlformats.org/drawingml/2006/main" xmlns:r="http://schemas.openxmlformats.org/officeDocument/2006/relationships" xmlns:p="http://schemas.openxmlformats.org/presentationml/2006/main">
+  <p:cSld>
+    <p:spTree>
+      <p:nvGrpSpPr>
+        <p:cNvPr id="1" name=""/>
+        <p:cNvGrpSpPr/>
+        <p:nvPr/>
+      </p:nvGrpSpPr>
+      <p:grpSpPr>
+        <a:xfrm>
+          <a:off x="0" y="0"/>
+          <a:ext cx="0" cy="0"/>
+          <a:chOff x="0" y="0"/>
+          <a:chExt cx="0" cy="0"/>
+        </a:xfrm>
+      </p:grpSpPr>
+      <p:sp>
+        <p:nvSpPr>
+          <p:cNvPr id="2" name="Slide Image Placeholder 1"/>
+          <p:cNvSpPr>
+            <a:spLocks noGrp="1" noRot="1" noChangeAspect="1"/>
+          </p:cNvSpPr>
+          <p:nvPr>
+            <p:ph type="sldImg"/>
+          </p:nvPr>
+        </p:nvSpPr>
+        <p:spPr/>
+      </p:sp>
+      <p:sp>
+        <p:nvSpPr>
+          <p:cNvPr id="3" name="Notes Placeholder 2"/>
+          <p:cNvSpPr>
+            <a:spLocks noGrp="1"/>
+          </p:cNvSpPr>
+          <p:nvPr>
+            <p:ph type="body" idx="1"/>
+          </p:nvPr>
+        </p:nvSpPr>
+        <p:spPr/>
+        <p:txBody>
+          <a:bodyPr/>
+          <a:lstStyle/>
+          <a:p>
+            <a:endParaRPr lang="en-US" dirty="0"/>
+          </a:p>
+        </p:txBody>
+      </p:sp>
+      <p:sp>
+        <p:nvSpPr>
+          <p:cNvPr id="4" name="Slide Number Placeholder 3"/>
+          <p:cNvSpPr>
+            <a:spLocks noGrp="1"/>
+          </p:cNvSpPr>
+          <p:nvPr>
+            <p:ph type="sldNum" sz="quarter" idx="5"/>
+          </p:nvPr>
+        </p:nvSpPr>
+        <p:spPr/>
+        <p:txBody>
+          <a:bodyPr/>
+          <a:lstStyle/>
+          <a:p>
+            <a:fld id="{841DC511-4480-4A82-BA29-F3464795B20B}" type="slidenum">
+              <a:rPr lang="en-US" smtClean="0"/>
+              <a:t>23</a:t>
+            </a:fld>
+            <a:endParaRPr lang="en-US"/>
+          </a:p>
+        </p:txBody>
+      </p:sp>
+    </p:spTree>
+    <p:extLst>
+      <p:ext uri="{BB962C8B-B14F-4D97-AF65-F5344CB8AC3E}">
+        <p14:creationId xmlns:p14="http://schemas.microsoft.com/office/powerpoint/2010/main" val="1211574965"/>
+      </p:ext>
+    </p:extLst>
+  </p:cSld>
+  <p:clrMapOvr>
+    <a:masterClrMapping/>
+  </p:clrMapOvr>
+</p:notes>
+</file>
+
 <file path=ppt/notesSlides/notesSlide3.xml><?xml version="1.0" encoding="utf-8"?>
 <p:notes xmlns:a="http://schemas.openxmlformats.org/drawingml/2006/main" xmlns:r="http://schemas.openxmlformats.org/officeDocument/2006/relationships" xmlns:p="http://schemas.openxmlformats.org/presentationml/2006/main">
   <p:cSld>
@@ -8472,7 +8557,7 @@
           <a:p>
             <a:fld id="{B44059F8-73F0-4410-A87B-3A37E6C5A5AB}" type="datetimeFigureOut">
               <a:rPr lang="en-US" smtClean="0"/>
-              <a:t>2/20/2019</a:t>
+              <a:t>2/27/2019</a:t>
             </a:fld>
             <a:endParaRPr lang="en-US"/>
           </a:p>
@@ -8747,7 +8832,7 @@
           <a:p>
             <a:fld id="{B44059F8-73F0-4410-A87B-3A37E6C5A5AB}" type="datetimeFigureOut">
               <a:rPr lang="en-US" smtClean="0"/>
-              <a:t>2/20/2019</a:t>
+              <a:t>2/27/2019</a:t>
             </a:fld>
             <a:endParaRPr lang="en-US"/>
           </a:p>
@@ -8941,7 +9026,7 @@
           <a:p>
             <a:fld id="{B44059F8-73F0-4410-A87B-3A37E6C5A5AB}" type="datetimeFigureOut">
               <a:rPr lang="en-US" smtClean="0"/>
-              <a:t>2/20/2019</a:t>
+              <a:t>2/27/2019</a:t>
             </a:fld>
             <a:endParaRPr lang="en-US"/>
           </a:p>
@@ -9214,7 +9299,7 @@
           <a:p>
             <a:fld id="{B44059F8-73F0-4410-A87B-3A37E6C5A5AB}" type="datetimeFigureOut">
               <a:rPr lang="en-US" smtClean="0"/>
-              <a:t>2/20/2019</a:t>
+              <a:t>2/27/2019</a:t>
             </a:fld>
             <a:endParaRPr lang="en-US"/>
           </a:p>
@@ -9555,7 +9640,7 @@
           <a:p>
             <a:fld id="{B44059F8-73F0-4410-A87B-3A37E6C5A5AB}" type="datetimeFigureOut">
               <a:rPr lang="en-US" smtClean="0"/>
-              <a:t>2/20/2019</a:t>
+              <a:t>2/27/2019</a:t>
             </a:fld>
             <a:endParaRPr lang="en-US"/>
           </a:p>
@@ -10178,7 +10263,7 @@
           <a:p>
             <a:fld id="{B44059F8-73F0-4410-A87B-3A37E6C5A5AB}" type="datetimeFigureOut">
               <a:rPr lang="en-US" smtClean="0"/>
-              <a:t>2/20/2019</a:t>
+              <a:t>2/27/2019</a:t>
             </a:fld>
             <a:endParaRPr lang="en-US"/>
           </a:p>
@@ -11038,7 +11123,7 @@
           <a:p>
             <a:fld id="{B44059F8-73F0-4410-A87B-3A37E6C5A5AB}" type="datetimeFigureOut">
               <a:rPr lang="en-US" smtClean="0"/>
-              <a:t>2/20/2019</a:t>
+              <a:t>2/27/2019</a:t>
             </a:fld>
             <a:endParaRPr lang="en-US"/>
           </a:p>
@@ -11208,7 +11293,7 @@
           <a:p>
             <a:fld id="{B44059F8-73F0-4410-A87B-3A37E6C5A5AB}" type="datetimeFigureOut">
               <a:rPr lang="en-US" smtClean="0"/>
-              <a:t>2/20/2019</a:t>
+              <a:t>2/27/2019</a:t>
             </a:fld>
             <a:endParaRPr lang="en-US"/>
           </a:p>
@@ -11388,7 +11473,7 @@
           <a:p>
             <a:fld id="{B44059F8-73F0-4410-A87B-3A37E6C5A5AB}" type="datetimeFigureOut">
               <a:rPr lang="en-US" smtClean="0"/>
-              <a:t>2/20/2019</a:t>
+              <a:t>2/27/2019</a:t>
             </a:fld>
             <a:endParaRPr lang="en-US"/>
           </a:p>
@@ -11558,7 +11643,7 @@
           <a:p>
             <a:fld id="{B44059F8-73F0-4410-A87B-3A37E6C5A5AB}" type="datetimeFigureOut">
               <a:rPr lang="en-US" smtClean="0"/>
-              <a:t>2/20/2019</a:t>
+              <a:t>2/27/2019</a:t>
             </a:fld>
             <a:endParaRPr lang="en-US"/>
           </a:p>
@@ -11805,7 +11890,7 @@
           <a:p>
             <a:fld id="{B44059F8-73F0-4410-A87B-3A37E6C5A5AB}" type="datetimeFigureOut">
               <a:rPr lang="en-US" smtClean="0"/>
-              <a:t>2/20/2019</a:t>
+              <a:t>2/27/2019</a:t>
             </a:fld>
             <a:endParaRPr lang="en-US"/>
           </a:p>
@@ -12097,7 +12182,7 @@
           <a:p>
             <a:fld id="{B44059F8-73F0-4410-A87B-3A37E6C5A5AB}" type="datetimeFigureOut">
               <a:rPr lang="en-US" smtClean="0"/>
-              <a:t>2/20/2019</a:t>
+              <a:t>2/27/2019</a:t>
             </a:fld>
             <a:endParaRPr lang="en-US"/>
           </a:p>
@@ -12541,7 +12626,7 @@
           <a:p>
             <a:fld id="{B44059F8-73F0-4410-A87B-3A37E6C5A5AB}" type="datetimeFigureOut">
               <a:rPr lang="en-US" smtClean="0"/>
-              <a:t>2/20/2019</a:t>
+              <a:t>2/27/2019</a:t>
             </a:fld>
             <a:endParaRPr lang="en-US"/>
           </a:p>
@@ -12659,7 +12744,7 @@
           <a:p>
             <a:fld id="{B44059F8-73F0-4410-A87B-3A37E6C5A5AB}" type="datetimeFigureOut">
               <a:rPr lang="en-US" smtClean="0"/>
-              <a:t>2/20/2019</a:t>
+              <a:t>2/27/2019</a:t>
             </a:fld>
             <a:endParaRPr lang="en-US"/>
           </a:p>
@@ -12754,7 +12839,7 @@
           <a:p>
             <a:fld id="{B44059F8-73F0-4410-A87B-3A37E6C5A5AB}" type="datetimeFigureOut">
               <a:rPr lang="en-US" smtClean="0"/>
-              <a:t>2/20/2019</a:t>
+              <a:t>2/27/2019</a:t>
             </a:fld>
             <a:endParaRPr lang="en-US"/>
           </a:p>
@@ -13033,7 +13118,7 @@
           <a:p>
             <a:fld id="{B44059F8-73F0-4410-A87B-3A37E6C5A5AB}" type="datetimeFigureOut">
               <a:rPr lang="en-US" smtClean="0"/>
-              <a:t>2/20/2019</a:t>
+              <a:t>2/27/2019</a:t>
             </a:fld>
             <a:endParaRPr lang="en-US"/>
           </a:p>
@@ -13308,7 +13393,7 @@
           <a:p>
             <a:fld id="{B44059F8-73F0-4410-A87B-3A37E6C5A5AB}" type="datetimeFigureOut">
               <a:rPr lang="en-US" smtClean="0"/>
-              <a:t>2/20/2019</a:t>
+              <a:t>2/27/2019</a:t>
             </a:fld>
             <a:endParaRPr lang="en-US"/>
           </a:p>
@@ -13737,7 +13822,7 @@
           <a:p>
             <a:fld id="{B44059F8-73F0-4410-A87B-3A37E6C5A5AB}" type="datetimeFigureOut">
               <a:rPr lang="en-US" smtClean="0"/>
-              <a:t>2/20/2019</a:t>
+              <a:t>2/27/2019</a:t>
             </a:fld>
             <a:endParaRPr lang="en-US"/>
           </a:p>
@@ -14641,7 +14726,7 @@
           <a:graphicData uri="http://schemas.openxmlformats.org/presentationml/2006/ole">
             <mc:AlternateContent xmlns:mc="http://schemas.openxmlformats.org/markup-compatibility/2006">
               <mc:Choice xmlns:v="urn:schemas-microsoft-com:vml" Requires="v">
-                <p:oleObj spid="_x0000_s1116" name="Bitmap Image" r:id="rId5" imgW="5734080" imgH="5276880" progId="Paint.Picture">
+                <p:oleObj spid="_x0000_s1129" name="Bitmap Image" r:id="rId5" imgW="5734080" imgH="5276880" progId="Paint.Picture">
                   <p:embed/>
                 </p:oleObj>
               </mc:Choice>
@@ -17912,6 +17997,2246 @@
 </p:sld>
 </file>
 
+<file path=ppt/slides/slide23.xml><?xml version="1.0" encoding="utf-8"?>
+<p:sld xmlns:a="http://schemas.openxmlformats.org/drawingml/2006/main" xmlns:r="http://schemas.openxmlformats.org/officeDocument/2006/relationships" xmlns:p="http://schemas.openxmlformats.org/presentationml/2006/main">
+  <p:cSld>
+    <p:spTree>
+      <p:nvGrpSpPr>
+        <p:cNvPr id="1" name=""/>
+        <p:cNvGrpSpPr/>
+        <p:nvPr/>
+      </p:nvGrpSpPr>
+      <p:grpSpPr>
+        <a:xfrm>
+          <a:off x="0" y="0"/>
+          <a:ext cx="0" cy="0"/>
+          <a:chOff x="0" y="0"/>
+          <a:chExt cx="0" cy="0"/>
+        </a:xfrm>
+      </p:grpSpPr>
+      <p:sp>
+        <p:nvSpPr>
+          <p:cNvPr id="2" name="Title 1">
+            <a:extLst>
+              <a:ext uri="{FF2B5EF4-FFF2-40B4-BE49-F238E27FC236}">
+                <a16:creationId xmlns:a16="http://schemas.microsoft.com/office/drawing/2014/main" id="{44BC81E5-E682-4891-BE20-29DE236CBCE7}"/>
+              </a:ext>
+            </a:extLst>
+          </p:cNvPr>
+          <p:cNvSpPr>
+            <a:spLocks noGrp="1"/>
+          </p:cNvSpPr>
+          <p:nvPr>
+            <p:ph type="title"/>
+          </p:nvPr>
+        </p:nvSpPr>
+        <p:spPr>
+          <a:xfrm>
+            <a:off x="0" y="420252"/>
+            <a:ext cx="9404723" cy="741405"/>
+          </a:xfrm>
+        </p:spPr>
+        <p:txBody>
+          <a:bodyPr/>
+          <a:lstStyle/>
+          <a:p>
+            <a:r>
+              <a:rPr lang="en-US" dirty="0"/>
+              <a:t>ORACLE DB Containers</a:t>
+            </a:r>
+          </a:p>
+        </p:txBody>
+      </p:sp>
+      <p:grpSp>
+        <p:nvGrpSpPr>
+          <p:cNvPr id="97" name="Group 96">
+            <a:extLst>
+              <a:ext uri="{FF2B5EF4-FFF2-40B4-BE49-F238E27FC236}">
+                <a16:creationId xmlns:a16="http://schemas.microsoft.com/office/drawing/2014/main" id="{342B7623-7EAD-40C2-ABF1-BAFF0D684A5E}"/>
+              </a:ext>
+            </a:extLst>
+          </p:cNvPr>
+          <p:cNvGrpSpPr/>
+          <p:nvPr/>
+        </p:nvGrpSpPr>
+        <p:grpSpPr>
+          <a:xfrm>
+            <a:off x="5737133" y="265671"/>
+            <a:ext cx="6311957" cy="6362756"/>
+            <a:chOff x="5737133" y="265671"/>
+            <a:chExt cx="6311957" cy="6362756"/>
+          </a:xfrm>
+        </p:grpSpPr>
+        <p:sp>
+          <p:nvSpPr>
+            <p:cNvPr id="77" name="TextBox 76">
+              <a:extLst>
+                <a:ext uri="{FF2B5EF4-FFF2-40B4-BE49-F238E27FC236}">
+                  <a16:creationId xmlns:a16="http://schemas.microsoft.com/office/drawing/2014/main" id="{2172F6A4-1963-463A-9FED-48863F6DFB3F}"/>
+                </a:ext>
+              </a:extLst>
+            </p:cNvPr>
+            <p:cNvSpPr txBox="1"/>
+            <p:nvPr/>
+          </p:nvSpPr>
+          <p:spPr>
+            <a:xfrm>
+              <a:off x="9614800" y="2470183"/>
+              <a:ext cx="2316064" cy="261610"/>
+            </a:xfrm>
+            <a:prstGeom prst="rect">
+              <a:avLst/>
+            </a:prstGeom>
+            <a:noFill/>
+          </p:spPr>
+          <p:txBody>
+            <a:bodyPr wrap="square" rtlCol="0">
+              <a:spAutoFit/>
+            </a:bodyPr>
+            <a:lstStyle/>
+            <a:p>
+              <a:r>
+                <a:rPr lang="en-US" sz="1100" b="1" dirty="0"/>
+                <a:t>Publish Image from Containers</a:t>
+              </a:r>
+            </a:p>
+          </p:txBody>
+        </p:sp>
+        <p:grpSp>
+          <p:nvGrpSpPr>
+            <p:cNvPr id="96" name="Group 95">
+              <a:extLst>
+                <a:ext uri="{FF2B5EF4-FFF2-40B4-BE49-F238E27FC236}">
+                  <a16:creationId xmlns:a16="http://schemas.microsoft.com/office/drawing/2014/main" id="{66B50012-7FFC-4930-A78B-304BBAF6F11B}"/>
+                </a:ext>
+              </a:extLst>
+            </p:cNvPr>
+            <p:cNvGrpSpPr/>
+            <p:nvPr/>
+          </p:nvGrpSpPr>
+          <p:grpSpPr>
+            <a:xfrm>
+              <a:off x="5737133" y="265671"/>
+              <a:ext cx="6311957" cy="6362756"/>
+              <a:chOff x="5527064" y="265671"/>
+              <a:chExt cx="6311957" cy="6362756"/>
+            </a:xfrm>
+          </p:grpSpPr>
+          <p:sp>
+            <p:nvSpPr>
+              <p:cNvPr id="60" name="TextBox 59">
+                <a:extLst>
+                  <a:ext uri="{FF2B5EF4-FFF2-40B4-BE49-F238E27FC236}">
+                    <a16:creationId xmlns:a16="http://schemas.microsoft.com/office/drawing/2014/main" id="{AEF04F39-F8DF-4373-ACDB-BCDFB32B5060}"/>
+                  </a:ext>
+                </a:extLst>
+              </p:cNvPr>
+              <p:cNvSpPr txBox="1"/>
+              <p:nvPr/>
+            </p:nvSpPr>
+            <p:spPr>
+              <a:xfrm>
+                <a:off x="5527064" y="2548936"/>
+                <a:ext cx="2229665" cy="307777"/>
+              </a:xfrm>
+              <a:prstGeom prst="rect">
+                <a:avLst/>
+              </a:prstGeom>
+              <a:noFill/>
+            </p:spPr>
+            <p:txBody>
+              <a:bodyPr wrap="square" rtlCol="0">
+                <a:spAutoFit/>
+              </a:bodyPr>
+              <a:lstStyle/>
+              <a:p>
+                <a:r>
+                  <a:rPr lang="en-US" sz="1400" b="1" dirty="0"/>
+                  <a:t>Client Apps or Teams</a:t>
+                </a:r>
+              </a:p>
+            </p:txBody>
+          </p:sp>
+          <p:grpSp>
+            <p:nvGrpSpPr>
+              <p:cNvPr id="95" name="Group 94">
+                <a:extLst>
+                  <a:ext uri="{FF2B5EF4-FFF2-40B4-BE49-F238E27FC236}">
+                    <a16:creationId xmlns:a16="http://schemas.microsoft.com/office/drawing/2014/main" id="{FFD3AADA-D57A-49A6-9AA5-0E9DD0AD4DB8}"/>
+                  </a:ext>
+                </a:extLst>
+              </p:cNvPr>
+              <p:cNvGrpSpPr/>
+              <p:nvPr/>
+            </p:nvGrpSpPr>
+            <p:grpSpPr>
+              <a:xfrm>
+                <a:off x="5868063" y="265671"/>
+                <a:ext cx="5970958" cy="6362756"/>
+                <a:chOff x="5793921" y="265671"/>
+                <a:chExt cx="5970958" cy="6362756"/>
+              </a:xfrm>
+            </p:grpSpPr>
+            <p:grpSp>
+              <p:nvGrpSpPr>
+                <p:cNvPr id="52" name="Group 51">
+                  <a:extLst>
+                    <a:ext uri="{FF2B5EF4-FFF2-40B4-BE49-F238E27FC236}">
+                      <a16:creationId xmlns:a16="http://schemas.microsoft.com/office/drawing/2014/main" id="{1C995C1C-B78D-4F28-B9F1-565AAF8FAE68}"/>
+                    </a:ext>
+                  </a:extLst>
+                </p:cNvPr>
+                <p:cNvGrpSpPr/>
+                <p:nvPr/>
+              </p:nvGrpSpPr>
+              <p:grpSpPr>
+                <a:xfrm>
+                  <a:off x="7936559" y="265671"/>
+                  <a:ext cx="3828320" cy="6362756"/>
+                  <a:chOff x="6429019" y="265671"/>
+                  <a:chExt cx="3828320" cy="6362756"/>
+                </a:xfrm>
+              </p:grpSpPr>
+              <p:sp>
+                <p:nvSpPr>
+                  <p:cNvPr id="15" name="Rectangle 14">
+                    <a:extLst>
+                      <a:ext uri="{FF2B5EF4-FFF2-40B4-BE49-F238E27FC236}">
+                        <a16:creationId xmlns:a16="http://schemas.microsoft.com/office/drawing/2014/main" id="{CD733755-3767-4AC3-B4D5-0C0D2C31A345}"/>
+                      </a:ext>
+                    </a:extLst>
+                  </p:cNvPr>
+                  <p:cNvSpPr/>
+                  <p:nvPr/>
+                </p:nvSpPr>
+                <p:spPr>
+                  <a:xfrm>
+                    <a:off x="6437870" y="2741190"/>
+                    <a:ext cx="3707022" cy="3887237"/>
+                  </a:xfrm>
+                  <a:prstGeom prst="rect">
+                    <a:avLst/>
+                  </a:prstGeom>
+                  <a:solidFill>
+                    <a:schemeClr val="bg1"/>
+                  </a:solidFill>
+                  <a:ln>
+                    <a:prstDash val="sysDash"/>
+                  </a:ln>
+                </p:spPr>
+                <p:style>
+                  <a:lnRef idx="2">
+                    <a:schemeClr val="accent1">
+                      <a:shade val="50000"/>
+                    </a:schemeClr>
+                  </a:lnRef>
+                  <a:fillRef idx="1">
+                    <a:schemeClr val="accent1"/>
+                  </a:fillRef>
+                  <a:effectRef idx="0">
+                    <a:schemeClr val="accent1"/>
+                  </a:effectRef>
+                  <a:fontRef idx="minor">
+                    <a:schemeClr val="lt1"/>
+                  </a:fontRef>
+                </p:style>
+                <p:txBody>
+                  <a:bodyPr rtlCol="0" anchor="ctr"/>
+                  <a:lstStyle/>
+                  <a:p>
+                    <a:pPr algn="ctr"/>
+                    <a:endParaRPr lang="en-US" dirty="0"/>
+                  </a:p>
+                </p:txBody>
+              </p:sp>
+              <p:sp>
+                <p:nvSpPr>
+                  <p:cNvPr id="4" name="Rectangle 3">
+                    <a:extLst>
+                      <a:ext uri="{FF2B5EF4-FFF2-40B4-BE49-F238E27FC236}">
+                        <a16:creationId xmlns:a16="http://schemas.microsoft.com/office/drawing/2014/main" id="{2C8E2A8C-4DFB-45AF-AC16-9218B463AB40}"/>
+                      </a:ext>
+                    </a:extLst>
+                  </p:cNvPr>
+                  <p:cNvSpPr/>
+                  <p:nvPr/>
+                </p:nvSpPr>
+                <p:spPr>
+                  <a:xfrm>
+                    <a:off x="6462578" y="265671"/>
+                    <a:ext cx="3682314" cy="2032688"/>
+                  </a:xfrm>
+                  <a:prstGeom prst="rect">
+                    <a:avLst/>
+                  </a:prstGeom>
+                  <a:solidFill>
+                    <a:schemeClr val="bg1"/>
+                  </a:solidFill>
+                  <a:ln>
+                    <a:prstDash val="sysDash"/>
+                  </a:ln>
+                </p:spPr>
+                <p:style>
+                  <a:lnRef idx="2">
+                    <a:schemeClr val="accent1">
+                      <a:shade val="50000"/>
+                    </a:schemeClr>
+                  </a:lnRef>
+                  <a:fillRef idx="1">
+                    <a:schemeClr val="accent1"/>
+                  </a:fillRef>
+                  <a:effectRef idx="0">
+                    <a:schemeClr val="accent1"/>
+                  </a:effectRef>
+                  <a:fontRef idx="minor">
+                    <a:schemeClr val="lt1"/>
+                  </a:fontRef>
+                </p:style>
+                <p:txBody>
+                  <a:bodyPr rtlCol="0" anchor="ctr"/>
+                  <a:lstStyle/>
+                  <a:p>
+                    <a:pPr algn="ctr"/>
+                    <a:endParaRPr lang="en-US" dirty="0"/>
+                  </a:p>
+                </p:txBody>
+              </p:sp>
+              <p:pic>
+                <p:nvPicPr>
+                  <p:cNvPr id="6" name="Graphic 5" descr="Database">
+                    <a:extLst>
+                      <a:ext uri="{FF2B5EF4-FFF2-40B4-BE49-F238E27FC236}">
+                        <a16:creationId xmlns:a16="http://schemas.microsoft.com/office/drawing/2014/main" id="{DE0B4386-8711-4FFC-B51C-5DEED2EC61DA}"/>
+                      </a:ext>
+                    </a:extLst>
+                  </p:cNvPr>
+                  <p:cNvPicPr>
+                    <a:picLocks noChangeAspect="1"/>
+                  </p:cNvPicPr>
+                  <p:nvPr/>
+                </p:nvPicPr>
+                <p:blipFill>
+                  <a:blip r:embed="rId3">
+                    <a:extLst>
+                      <a:ext uri="{28A0092B-C50C-407E-A947-70E740481C1C}">
+                        <a14:useLocalDpi xmlns:a14="http://schemas.microsoft.com/office/drawing/2010/main" val="0"/>
+                      </a:ext>
+                      <a:ext uri="{96DAC541-7B7A-43D3-8B79-37D633B846F1}">
+                        <asvg:svgBlip xmlns:asvg="http://schemas.microsoft.com/office/drawing/2016/SVG/main" r:embed="rId4"/>
+                      </a:ext>
+                    </a:extLst>
+                  </a:blip>
+                  <a:stretch>
+                    <a:fillRect/>
+                  </a:stretch>
+                </p:blipFill>
+                <p:spPr>
+                  <a:xfrm>
+                    <a:off x="8633252" y="2936573"/>
+                    <a:ext cx="1283263" cy="1283263"/>
+                  </a:xfrm>
+                  <a:prstGeom prst="rect">
+                    <a:avLst/>
+                  </a:prstGeom>
+                </p:spPr>
+              </p:pic>
+              <p:pic>
+                <p:nvPicPr>
+                  <p:cNvPr id="8" name="Graphic 7" descr="Paper">
+                    <a:extLst>
+                      <a:ext uri="{FF2B5EF4-FFF2-40B4-BE49-F238E27FC236}">
+                        <a16:creationId xmlns:a16="http://schemas.microsoft.com/office/drawing/2014/main" id="{ABFDC7F4-B2A1-465D-9E78-905675EF5871}"/>
+                      </a:ext>
+                    </a:extLst>
+                  </p:cNvPr>
+                  <p:cNvPicPr>
+                    <a:picLocks noChangeAspect="1"/>
+                  </p:cNvPicPr>
+                  <p:nvPr/>
+                </p:nvPicPr>
+                <p:blipFill>
+                  <a:blip r:embed="rId5">
+                    <a:extLst>
+                      <a:ext uri="{28A0092B-C50C-407E-A947-70E740481C1C}">
+                        <a14:useLocalDpi xmlns:a14="http://schemas.microsoft.com/office/drawing/2010/main" val="0"/>
+                      </a:ext>
+                      <a:ext uri="{96DAC541-7B7A-43D3-8B79-37D633B846F1}">
+                        <asvg:svgBlip xmlns:asvg="http://schemas.microsoft.com/office/drawing/2016/SVG/main" r:embed="rId6"/>
+                      </a:ext>
+                    </a:extLst>
+                  </a:blip>
+                  <a:stretch>
+                    <a:fillRect/>
+                  </a:stretch>
+                </p:blipFill>
+                <p:spPr>
+                  <a:xfrm>
+                    <a:off x="9403487" y="265671"/>
+                    <a:ext cx="741405" cy="741405"/>
+                  </a:xfrm>
+                  <a:prstGeom prst="rect">
+                    <a:avLst/>
+                  </a:prstGeom>
+                </p:spPr>
+              </p:pic>
+              <p:pic>
+                <p:nvPicPr>
+                  <p:cNvPr id="9" name="Graphic 8" descr="Paper">
+                    <a:extLst>
+                      <a:ext uri="{FF2B5EF4-FFF2-40B4-BE49-F238E27FC236}">
+                        <a16:creationId xmlns:a16="http://schemas.microsoft.com/office/drawing/2014/main" id="{6FC560CC-F607-44A8-8781-84C9D9A6C1B3}"/>
+                      </a:ext>
+                    </a:extLst>
+                  </p:cNvPr>
+                  <p:cNvPicPr>
+                    <a:picLocks noChangeAspect="1"/>
+                  </p:cNvPicPr>
+                  <p:nvPr/>
+                </p:nvPicPr>
+                <p:blipFill>
+                  <a:blip r:embed="rId5">
+                    <a:extLst>
+                      <a:ext uri="{28A0092B-C50C-407E-A947-70E740481C1C}">
+                        <a14:useLocalDpi xmlns:a14="http://schemas.microsoft.com/office/drawing/2010/main" val="0"/>
+                      </a:ext>
+                      <a:ext uri="{96DAC541-7B7A-43D3-8B79-37D633B846F1}">
+                        <asvg:svgBlip xmlns:asvg="http://schemas.microsoft.com/office/drawing/2016/SVG/main" r:embed="rId6"/>
+                      </a:ext>
+                    </a:extLst>
+                  </a:blip>
+                  <a:stretch>
+                    <a:fillRect/>
+                  </a:stretch>
+                </p:blipFill>
+                <p:spPr>
+                  <a:xfrm>
+                    <a:off x="6573792" y="1253243"/>
+                    <a:ext cx="741405" cy="741405"/>
+                  </a:xfrm>
+                  <a:prstGeom prst="rect">
+                    <a:avLst/>
+                  </a:prstGeom>
+                </p:spPr>
+              </p:pic>
+              <p:sp>
+                <p:nvSpPr>
+                  <p:cNvPr id="10" name="TextBox 9">
+                    <a:extLst>
+                      <a:ext uri="{FF2B5EF4-FFF2-40B4-BE49-F238E27FC236}">
+                        <a16:creationId xmlns:a16="http://schemas.microsoft.com/office/drawing/2014/main" id="{85B3E7E6-9A1B-4908-AFB6-224D9E15593F}"/>
+                      </a:ext>
+                    </a:extLst>
+                  </p:cNvPr>
+                  <p:cNvSpPr txBox="1"/>
+                  <p:nvPr/>
+                </p:nvSpPr>
+                <p:spPr>
+                  <a:xfrm>
+                    <a:off x="6487910" y="312009"/>
+                    <a:ext cx="3015049" cy="307777"/>
+                  </a:xfrm>
+                  <a:prstGeom prst="rect">
+                    <a:avLst/>
+                  </a:prstGeom>
+                  <a:noFill/>
+                </p:spPr>
+                <p:txBody>
+                  <a:bodyPr wrap="square" rtlCol="0">
+                    <a:spAutoFit/>
+                  </a:bodyPr>
+                  <a:lstStyle/>
+                  <a:p>
+                    <a:r>
+                      <a:rPr lang="en-US" sz="1400" b="1" dirty="0"/>
+                      <a:t>Private Nexus Docker Repository</a:t>
+                    </a:r>
+                  </a:p>
+                </p:txBody>
+              </p:sp>
+              <p:pic>
+                <p:nvPicPr>
+                  <p:cNvPr id="11" name="Graphic 10" descr="Paper">
+                    <a:extLst>
+                      <a:ext uri="{FF2B5EF4-FFF2-40B4-BE49-F238E27FC236}">
+                        <a16:creationId xmlns:a16="http://schemas.microsoft.com/office/drawing/2014/main" id="{A09DDA68-101E-4590-9879-C1578A66039C}"/>
+                      </a:ext>
+                    </a:extLst>
+                  </p:cNvPr>
+                  <p:cNvPicPr>
+                    <a:picLocks noChangeAspect="1"/>
+                  </p:cNvPicPr>
+                  <p:nvPr/>
+                </p:nvPicPr>
+                <p:blipFill>
+                  <a:blip r:embed="rId5">
+                    <a:extLst>
+                      <a:ext uri="{28A0092B-C50C-407E-A947-70E740481C1C}">
+                        <a14:useLocalDpi xmlns:a14="http://schemas.microsoft.com/office/drawing/2010/main" val="0"/>
+                      </a:ext>
+                      <a:ext uri="{96DAC541-7B7A-43D3-8B79-37D633B846F1}">
+                        <asvg:svgBlip xmlns:asvg="http://schemas.microsoft.com/office/drawing/2016/SVG/main" r:embed="rId6"/>
+                      </a:ext>
+                    </a:extLst>
+                  </a:blip>
+                  <a:stretch>
+                    <a:fillRect/>
+                  </a:stretch>
+                </p:blipFill>
+                <p:spPr>
+                  <a:xfrm>
+                    <a:off x="7155175" y="1266573"/>
+                    <a:ext cx="741405" cy="741405"/>
+                  </a:xfrm>
+                  <a:prstGeom prst="rect">
+                    <a:avLst/>
+                  </a:prstGeom>
+                </p:spPr>
+              </p:pic>
+              <p:pic>
+                <p:nvPicPr>
+                  <p:cNvPr id="12" name="Graphic 11" descr="Paper">
+                    <a:extLst>
+                      <a:ext uri="{FF2B5EF4-FFF2-40B4-BE49-F238E27FC236}">
+                        <a16:creationId xmlns:a16="http://schemas.microsoft.com/office/drawing/2014/main" id="{C52896D3-C2DF-4203-8852-59E68AC5516A}"/>
+                      </a:ext>
+                    </a:extLst>
+                  </p:cNvPr>
+                  <p:cNvPicPr>
+                    <a:picLocks noChangeAspect="1"/>
+                  </p:cNvPicPr>
+                  <p:nvPr/>
+                </p:nvPicPr>
+                <p:blipFill>
+                  <a:blip r:embed="rId5">
+                    <a:extLst>
+                      <a:ext uri="{28A0092B-C50C-407E-A947-70E740481C1C}">
+                        <a14:useLocalDpi xmlns:a14="http://schemas.microsoft.com/office/drawing/2010/main" val="0"/>
+                      </a:ext>
+                      <a:ext uri="{96DAC541-7B7A-43D3-8B79-37D633B846F1}">
+                        <asvg:svgBlip xmlns:asvg="http://schemas.microsoft.com/office/drawing/2016/SVG/main" r:embed="rId6"/>
+                      </a:ext>
+                    </a:extLst>
+                  </a:blip>
+                  <a:stretch>
+                    <a:fillRect/>
+                  </a:stretch>
+                </p:blipFill>
+                <p:spPr>
+                  <a:xfrm>
+                    <a:off x="7736558" y="1247063"/>
+                    <a:ext cx="741405" cy="741405"/>
+                  </a:xfrm>
+                  <a:prstGeom prst="rect">
+                    <a:avLst/>
+                  </a:prstGeom>
+                </p:spPr>
+              </p:pic>
+              <p:sp>
+                <p:nvSpPr>
+                  <p:cNvPr id="13" name="TextBox 12">
+                    <a:extLst>
+                      <a:ext uri="{FF2B5EF4-FFF2-40B4-BE49-F238E27FC236}">
+                        <a16:creationId xmlns:a16="http://schemas.microsoft.com/office/drawing/2014/main" id="{76D75EAB-4462-408B-ABD0-1B6CA12E7654}"/>
+                      </a:ext>
+                    </a:extLst>
+                  </p:cNvPr>
+                  <p:cNvSpPr txBox="1"/>
+                  <p:nvPr/>
+                </p:nvSpPr>
+                <p:spPr>
+                  <a:xfrm>
+                    <a:off x="7816569" y="1933196"/>
+                    <a:ext cx="2395977" cy="307777"/>
+                  </a:xfrm>
+                  <a:prstGeom prst="rect">
+                    <a:avLst/>
+                  </a:prstGeom>
+                  <a:noFill/>
+                </p:spPr>
+                <p:txBody>
+                  <a:bodyPr wrap="square" rtlCol="0">
+                    <a:spAutoFit/>
+                  </a:bodyPr>
+                  <a:lstStyle/>
+                  <a:p>
+                    <a:r>
+                      <a:rPr lang="en-US" sz="1400" b="1" dirty="0"/>
+                      <a:t>Database Images…</a:t>
+                    </a:r>
+                  </a:p>
+                </p:txBody>
+              </p:sp>
+              <p:sp>
+                <p:nvSpPr>
+                  <p:cNvPr id="14" name="TextBox 13">
+                    <a:extLst>
+                      <a:ext uri="{FF2B5EF4-FFF2-40B4-BE49-F238E27FC236}">
+                        <a16:creationId xmlns:a16="http://schemas.microsoft.com/office/drawing/2014/main" id="{B20109A0-A048-4F4A-BD3F-94083484DDF0}"/>
+                      </a:ext>
+                    </a:extLst>
+                  </p:cNvPr>
+                  <p:cNvSpPr txBox="1"/>
+                  <p:nvPr/>
+                </p:nvSpPr>
+                <p:spPr>
+                  <a:xfrm>
+                    <a:off x="7700634" y="872697"/>
+                    <a:ext cx="2556705" cy="307777"/>
+                  </a:xfrm>
+                  <a:prstGeom prst="rect">
+                    <a:avLst/>
+                  </a:prstGeom>
+                  <a:noFill/>
+                </p:spPr>
+                <p:txBody>
+                  <a:bodyPr wrap="square" rtlCol="0">
+                    <a:spAutoFit/>
+                  </a:bodyPr>
+                  <a:lstStyle/>
+                  <a:p>
+                    <a:r>
+                      <a:rPr lang="en-US" sz="1400" b="1" dirty="0"/>
+                      <a:t>Base Oracle 12.Slim Image</a:t>
+                    </a:r>
+                  </a:p>
+                </p:txBody>
+              </p:sp>
+              <p:sp>
+                <p:nvSpPr>
+                  <p:cNvPr id="16" name="Arrow: Down 15">
+                    <a:extLst>
+                      <a:ext uri="{FF2B5EF4-FFF2-40B4-BE49-F238E27FC236}">
+                        <a16:creationId xmlns:a16="http://schemas.microsoft.com/office/drawing/2014/main" id="{CA80FBAC-72EB-46D2-A2C3-6EDD5D3CE9EC}"/>
+                      </a:ext>
+                    </a:extLst>
+                  </p:cNvPr>
+                  <p:cNvSpPr/>
+                  <p:nvPr/>
+                </p:nvSpPr>
+                <p:spPr>
+                  <a:xfrm>
+                    <a:off x="7081035" y="2332340"/>
+                    <a:ext cx="581383" cy="394797"/>
+                  </a:xfrm>
+                  <a:prstGeom prst="downArrow">
+                    <a:avLst/>
+                  </a:prstGeom>
+                  <a:solidFill>
+                    <a:schemeClr val="bg1"/>
+                  </a:solidFill>
+                </p:spPr>
+                <p:style>
+                  <a:lnRef idx="2">
+                    <a:schemeClr val="accent1">
+                      <a:shade val="50000"/>
+                    </a:schemeClr>
+                  </a:lnRef>
+                  <a:fillRef idx="1">
+                    <a:schemeClr val="accent1"/>
+                  </a:fillRef>
+                  <a:effectRef idx="0">
+                    <a:schemeClr val="accent1"/>
+                  </a:effectRef>
+                  <a:fontRef idx="minor">
+                    <a:schemeClr val="lt1"/>
+                  </a:fontRef>
+                </p:style>
+                <p:txBody>
+                  <a:bodyPr rtlCol="0" anchor="ctr"/>
+                  <a:lstStyle/>
+                  <a:p>
+                    <a:pPr algn="ctr"/>
+                    <a:endParaRPr lang="en-US"/>
+                  </a:p>
+                </p:txBody>
+              </p:sp>
+              <p:sp>
+                <p:nvSpPr>
+                  <p:cNvPr id="18" name="TextBox 17">
+                    <a:extLst>
+                      <a:ext uri="{FF2B5EF4-FFF2-40B4-BE49-F238E27FC236}">
+                        <a16:creationId xmlns:a16="http://schemas.microsoft.com/office/drawing/2014/main" id="{A28B704A-D061-4C1C-B24D-08DDDDAA54CB}"/>
+                      </a:ext>
+                    </a:extLst>
+                  </p:cNvPr>
+                  <p:cNvSpPr txBox="1"/>
+                  <p:nvPr/>
+                </p:nvSpPr>
+                <p:spPr>
+                  <a:xfrm>
+                    <a:off x="7648425" y="5951947"/>
+                    <a:ext cx="1727061" cy="292388"/>
+                  </a:xfrm>
+                  <a:prstGeom prst="rect">
+                    <a:avLst/>
+                  </a:prstGeom>
+                  <a:noFill/>
+                </p:spPr>
+                <p:txBody>
+                  <a:bodyPr wrap="square" rtlCol="0">
+                    <a:spAutoFit/>
+                  </a:bodyPr>
+                  <a:lstStyle/>
+                  <a:p>
+                    <a:r>
+                      <a:rPr lang="en-US" sz="1300" b="1" dirty="0"/>
+                      <a:t>DB Container</a:t>
+                    </a:r>
+                  </a:p>
+                </p:txBody>
+              </p:sp>
+              <p:pic>
+                <p:nvPicPr>
+                  <p:cNvPr id="23" name="Graphic 22" descr="Database">
+                    <a:extLst>
+                      <a:ext uri="{FF2B5EF4-FFF2-40B4-BE49-F238E27FC236}">
+                        <a16:creationId xmlns:a16="http://schemas.microsoft.com/office/drawing/2014/main" id="{3952307D-6FAF-4B69-9E6E-2B41AA14788F}"/>
+                      </a:ext>
+                    </a:extLst>
+                  </p:cNvPr>
+                  <p:cNvPicPr>
+                    <a:picLocks noChangeAspect="1"/>
+                  </p:cNvPicPr>
+                  <p:nvPr/>
+                </p:nvPicPr>
+                <p:blipFill>
+                  <a:blip r:embed="rId3">
+                    <a:extLst>
+                      <a:ext uri="{28A0092B-C50C-407E-A947-70E740481C1C}">
+                        <a14:useLocalDpi xmlns:a14="http://schemas.microsoft.com/office/drawing/2010/main" val="0"/>
+                      </a:ext>
+                      <a:ext uri="{96DAC541-7B7A-43D3-8B79-37D633B846F1}">
+                        <asvg:svgBlip xmlns:asvg="http://schemas.microsoft.com/office/drawing/2016/SVG/main" r:embed="rId4"/>
+                      </a:ext>
+                    </a:extLst>
+                  </a:blip>
+                  <a:stretch>
+                    <a:fillRect/>
+                  </a:stretch>
+                </p:blipFill>
+                <p:spPr>
+                  <a:xfrm>
+                    <a:off x="8637370" y="4028085"/>
+                    <a:ext cx="1283263" cy="1283263"/>
+                  </a:xfrm>
+                  <a:prstGeom prst="rect">
+                    <a:avLst/>
+                  </a:prstGeom>
+                </p:spPr>
+              </p:pic>
+              <p:pic>
+                <p:nvPicPr>
+                  <p:cNvPr id="24" name="Graphic 23" descr="Database">
+                    <a:extLst>
+                      <a:ext uri="{FF2B5EF4-FFF2-40B4-BE49-F238E27FC236}">
+                        <a16:creationId xmlns:a16="http://schemas.microsoft.com/office/drawing/2014/main" id="{E8CF7BE2-018D-4C27-8BEF-0BA6E5D7601B}"/>
+                      </a:ext>
+                    </a:extLst>
+                  </p:cNvPr>
+                  <p:cNvPicPr>
+                    <a:picLocks noChangeAspect="1"/>
+                  </p:cNvPicPr>
+                  <p:nvPr/>
+                </p:nvPicPr>
+                <p:blipFill>
+                  <a:blip r:embed="rId3">
+                    <a:extLst>
+                      <a:ext uri="{28A0092B-C50C-407E-A947-70E740481C1C}">
+                        <a14:useLocalDpi xmlns:a14="http://schemas.microsoft.com/office/drawing/2010/main" val="0"/>
+                      </a:ext>
+                      <a:ext uri="{96DAC541-7B7A-43D3-8B79-37D633B846F1}">
+                        <asvg:svgBlip xmlns:asvg="http://schemas.microsoft.com/office/drawing/2016/SVG/main" r:embed="rId4"/>
+                      </a:ext>
+                    </a:extLst>
+                  </a:blip>
+                  <a:stretch>
+                    <a:fillRect/>
+                  </a:stretch>
+                </p:blipFill>
+                <p:spPr>
+                  <a:xfrm>
+                    <a:off x="8637368" y="5152554"/>
+                    <a:ext cx="1283263" cy="1283263"/>
+                  </a:xfrm>
+                  <a:prstGeom prst="rect">
+                    <a:avLst/>
+                  </a:prstGeom>
+                </p:spPr>
+              </p:pic>
+              <p:sp>
+                <p:nvSpPr>
+                  <p:cNvPr id="30" name="TextBox 29">
+                    <a:extLst>
+                      <a:ext uri="{FF2B5EF4-FFF2-40B4-BE49-F238E27FC236}">
+                        <a16:creationId xmlns:a16="http://schemas.microsoft.com/office/drawing/2014/main" id="{6A45699D-CC48-4353-AE2A-550E5274D0D2}"/>
+                      </a:ext>
+                    </a:extLst>
+                  </p:cNvPr>
+                  <p:cNvSpPr txBox="1"/>
+                  <p:nvPr/>
+                </p:nvSpPr>
+                <p:spPr>
+                  <a:xfrm>
+                    <a:off x="6726192" y="6313411"/>
+                    <a:ext cx="3501701" cy="292388"/>
+                  </a:xfrm>
+                  <a:prstGeom prst="rect">
+                    <a:avLst/>
+                  </a:prstGeom>
+                  <a:noFill/>
+                </p:spPr>
+                <p:txBody>
+                  <a:bodyPr wrap="square" rtlCol="0">
+                    <a:spAutoFit/>
+                  </a:bodyPr>
+                  <a:lstStyle/>
+                  <a:p>
+                    <a:r>
+                      <a:rPr lang="en-US" sz="1300" b="1" dirty="0"/>
+                      <a:t>Docker Host Dedicated or Developer Box</a:t>
+                    </a:r>
+                  </a:p>
+                </p:txBody>
+              </p:sp>
+              <p:sp>
+                <p:nvSpPr>
+                  <p:cNvPr id="31" name="TextBox 30">
+                    <a:extLst>
+                      <a:ext uri="{FF2B5EF4-FFF2-40B4-BE49-F238E27FC236}">
+                        <a16:creationId xmlns:a16="http://schemas.microsoft.com/office/drawing/2014/main" id="{607BCD73-CED2-4503-BE46-BDF72974C6E9}"/>
+                      </a:ext>
+                    </a:extLst>
+                  </p:cNvPr>
+                  <p:cNvSpPr txBox="1"/>
+                  <p:nvPr/>
+                </p:nvSpPr>
+                <p:spPr>
+                  <a:xfrm>
+                    <a:off x="7694451" y="4893554"/>
+                    <a:ext cx="1727061" cy="292388"/>
+                  </a:xfrm>
+                  <a:prstGeom prst="rect">
+                    <a:avLst/>
+                  </a:prstGeom>
+                  <a:noFill/>
+                </p:spPr>
+                <p:txBody>
+                  <a:bodyPr wrap="square" rtlCol="0">
+                    <a:spAutoFit/>
+                  </a:bodyPr>
+                  <a:lstStyle/>
+                  <a:p>
+                    <a:r>
+                      <a:rPr lang="en-US" sz="1300" b="1" dirty="0"/>
+                      <a:t>DB Container</a:t>
+                    </a:r>
+                  </a:p>
+                </p:txBody>
+              </p:sp>
+              <p:sp>
+                <p:nvSpPr>
+                  <p:cNvPr id="32" name="TextBox 31">
+                    <a:extLst>
+                      <a:ext uri="{FF2B5EF4-FFF2-40B4-BE49-F238E27FC236}">
+                        <a16:creationId xmlns:a16="http://schemas.microsoft.com/office/drawing/2014/main" id="{89F783A0-7269-4A9D-86C1-BF0A384C386D}"/>
+                      </a:ext>
+                    </a:extLst>
+                  </p:cNvPr>
+                  <p:cNvSpPr txBox="1"/>
+                  <p:nvPr/>
+                </p:nvSpPr>
+                <p:spPr>
+                  <a:xfrm>
+                    <a:off x="7685907" y="3781254"/>
+                    <a:ext cx="1727061" cy="292388"/>
+                  </a:xfrm>
+                  <a:prstGeom prst="rect">
+                    <a:avLst/>
+                  </a:prstGeom>
+                  <a:noFill/>
+                </p:spPr>
+                <p:txBody>
+                  <a:bodyPr wrap="square" rtlCol="0">
+                    <a:spAutoFit/>
+                  </a:bodyPr>
+                  <a:lstStyle/>
+                  <a:p>
+                    <a:r>
+                      <a:rPr lang="en-US" sz="1300" b="1" dirty="0"/>
+                      <a:t>DB Container</a:t>
+                    </a:r>
+                  </a:p>
+                </p:txBody>
+              </p:sp>
+              <p:cxnSp>
+                <p:nvCxnSpPr>
+                  <p:cNvPr id="34" name="Straight Arrow Connector 33">
+                    <a:extLst>
+                      <a:ext uri="{FF2B5EF4-FFF2-40B4-BE49-F238E27FC236}">
+                        <a16:creationId xmlns:a16="http://schemas.microsoft.com/office/drawing/2014/main" id="{5E21281B-28E1-48BC-B9A9-DD611D393A3D}"/>
+                      </a:ext>
+                    </a:extLst>
+                  </p:cNvPr>
+                  <p:cNvCxnSpPr>
+                    <a:cxnSpLocks/>
+                  </p:cNvCxnSpPr>
+                  <p:nvPr/>
+                </p:nvCxnSpPr>
+                <p:spPr>
+                  <a:xfrm flipH="1">
+                    <a:off x="6487910" y="3490785"/>
+                    <a:ext cx="2405548" cy="0"/>
+                  </a:xfrm>
+                  <a:prstGeom prst="straightConnector1">
+                    <a:avLst/>
+                  </a:prstGeom>
+                  <a:ln w="38100">
+                    <a:headEnd type="triangle"/>
+                    <a:tailEnd type="triangle"/>
+                  </a:ln>
+                </p:spPr>
+                <p:style>
+                  <a:lnRef idx="1">
+                    <a:schemeClr val="accent1"/>
+                  </a:lnRef>
+                  <a:fillRef idx="0">
+                    <a:schemeClr val="accent1"/>
+                  </a:fillRef>
+                  <a:effectRef idx="0">
+                    <a:schemeClr val="accent1"/>
+                  </a:effectRef>
+                  <a:fontRef idx="minor">
+                    <a:schemeClr val="tx1"/>
+                  </a:fontRef>
+                </p:style>
+              </p:cxnSp>
+              <p:sp>
+                <p:nvSpPr>
+                  <p:cNvPr id="38" name="TextBox 37">
+                    <a:extLst>
+                      <a:ext uri="{FF2B5EF4-FFF2-40B4-BE49-F238E27FC236}">
+                        <a16:creationId xmlns:a16="http://schemas.microsoft.com/office/drawing/2014/main" id="{B35ED295-D3AA-4560-A5BB-627B64A9ACEA}"/>
+                      </a:ext>
+                    </a:extLst>
+                  </p:cNvPr>
+                  <p:cNvSpPr txBox="1"/>
+                  <p:nvPr/>
+                </p:nvSpPr>
+                <p:spPr>
+                  <a:xfrm>
+                    <a:off x="7983700" y="3186306"/>
+                    <a:ext cx="909757" cy="261610"/>
+                  </a:xfrm>
+                  <a:prstGeom prst="rect">
+                    <a:avLst/>
+                  </a:prstGeom>
+                  <a:noFill/>
+                </p:spPr>
+                <p:txBody>
+                  <a:bodyPr wrap="square" rtlCol="0">
+                    <a:spAutoFit/>
+                  </a:bodyPr>
+                  <a:lstStyle/>
+                  <a:p>
+                    <a:r>
+                      <a:rPr lang="en-US" sz="1100" b="1" dirty="0"/>
+                      <a:t>PORT: 1521</a:t>
+                    </a:r>
+                  </a:p>
+                </p:txBody>
+              </p:sp>
+              <p:sp>
+                <p:nvSpPr>
+                  <p:cNvPr id="40" name="TextBox 39">
+                    <a:extLst>
+                      <a:ext uri="{FF2B5EF4-FFF2-40B4-BE49-F238E27FC236}">
+                        <a16:creationId xmlns:a16="http://schemas.microsoft.com/office/drawing/2014/main" id="{3A3F9E37-B897-48C5-9AEE-4ACE27899D51}"/>
+                      </a:ext>
+                    </a:extLst>
+                  </p:cNvPr>
+                  <p:cNvSpPr txBox="1"/>
+                  <p:nvPr/>
+                </p:nvSpPr>
+                <p:spPr>
+                  <a:xfrm>
+                    <a:off x="6461969" y="3190763"/>
+                    <a:ext cx="1293354" cy="261610"/>
+                  </a:xfrm>
+                  <a:prstGeom prst="rect">
+                    <a:avLst/>
+                  </a:prstGeom>
+                  <a:noFill/>
+                </p:spPr>
+                <p:txBody>
+                  <a:bodyPr wrap="square" rtlCol="0">
+                    <a:spAutoFit/>
+                  </a:bodyPr>
+                  <a:lstStyle/>
+                  <a:p>
+                    <a:r>
+                      <a:rPr lang="en-US" sz="1100" b="1" dirty="0"/>
+                      <a:t>HOST PORT: 1521</a:t>
+                    </a:r>
+                  </a:p>
+                </p:txBody>
+              </p:sp>
+              <p:cxnSp>
+                <p:nvCxnSpPr>
+                  <p:cNvPr id="42" name="Straight Arrow Connector 41">
+                    <a:extLst>
+                      <a:ext uri="{FF2B5EF4-FFF2-40B4-BE49-F238E27FC236}">
+                        <a16:creationId xmlns:a16="http://schemas.microsoft.com/office/drawing/2014/main" id="{8BEA512F-83CE-451C-BA11-0C047FEA753F}"/>
+                      </a:ext>
+                    </a:extLst>
+                  </p:cNvPr>
+                  <p:cNvCxnSpPr>
+                    <a:cxnSpLocks/>
+                  </p:cNvCxnSpPr>
+                  <p:nvPr/>
+                </p:nvCxnSpPr>
+                <p:spPr>
+                  <a:xfrm flipH="1">
+                    <a:off x="6454960" y="4520511"/>
+                    <a:ext cx="2405547" cy="0"/>
+                  </a:xfrm>
+                  <a:prstGeom prst="straightConnector1">
+                    <a:avLst/>
+                  </a:prstGeom>
+                  <a:ln w="38100">
+                    <a:headEnd type="triangle"/>
+                    <a:tailEnd type="triangle"/>
+                  </a:ln>
+                </p:spPr>
+                <p:style>
+                  <a:lnRef idx="1">
+                    <a:schemeClr val="accent1"/>
+                  </a:lnRef>
+                  <a:fillRef idx="0">
+                    <a:schemeClr val="accent1"/>
+                  </a:fillRef>
+                  <a:effectRef idx="0">
+                    <a:schemeClr val="accent1"/>
+                  </a:effectRef>
+                  <a:fontRef idx="minor">
+                    <a:schemeClr val="tx1"/>
+                  </a:fontRef>
+                </p:style>
+              </p:cxnSp>
+              <p:sp>
+                <p:nvSpPr>
+                  <p:cNvPr id="43" name="TextBox 42">
+                    <a:extLst>
+                      <a:ext uri="{FF2B5EF4-FFF2-40B4-BE49-F238E27FC236}">
+                        <a16:creationId xmlns:a16="http://schemas.microsoft.com/office/drawing/2014/main" id="{01BCF9BC-36D7-4147-9D2D-1C831A7B1109}"/>
+                      </a:ext>
+                    </a:extLst>
+                  </p:cNvPr>
+                  <p:cNvSpPr txBox="1"/>
+                  <p:nvPr/>
+                </p:nvSpPr>
+                <p:spPr>
+                  <a:xfrm>
+                    <a:off x="7950750" y="4216032"/>
+                    <a:ext cx="909757" cy="261610"/>
+                  </a:xfrm>
+                  <a:prstGeom prst="rect">
+                    <a:avLst/>
+                  </a:prstGeom>
+                  <a:noFill/>
+                </p:spPr>
+                <p:txBody>
+                  <a:bodyPr wrap="square" rtlCol="0">
+                    <a:spAutoFit/>
+                  </a:bodyPr>
+                  <a:lstStyle/>
+                  <a:p>
+                    <a:r>
+                      <a:rPr lang="en-US" sz="1100" b="1" dirty="0"/>
+                      <a:t>PORT: 1521</a:t>
+                    </a:r>
+                  </a:p>
+                </p:txBody>
+              </p:sp>
+              <p:sp>
+                <p:nvSpPr>
+                  <p:cNvPr id="44" name="TextBox 43">
+                    <a:extLst>
+                      <a:ext uri="{FF2B5EF4-FFF2-40B4-BE49-F238E27FC236}">
+                        <a16:creationId xmlns:a16="http://schemas.microsoft.com/office/drawing/2014/main" id="{E0E7FF0E-3134-42CF-AA51-159CF4AD5045}"/>
+                      </a:ext>
+                    </a:extLst>
+                  </p:cNvPr>
+                  <p:cNvSpPr txBox="1"/>
+                  <p:nvPr/>
+                </p:nvSpPr>
+                <p:spPr>
+                  <a:xfrm>
+                    <a:off x="6429019" y="4220489"/>
+                    <a:ext cx="1293354" cy="261610"/>
+                  </a:xfrm>
+                  <a:prstGeom prst="rect">
+                    <a:avLst/>
+                  </a:prstGeom>
+                  <a:noFill/>
+                </p:spPr>
+                <p:txBody>
+                  <a:bodyPr wrap="square" rtlCol="0">
+                    <a:spAutoFit/>
+                  </a:bodyPr>
+                  <a:lstStyle/>
+                  <a:p>
+                    <a:r>
+                      <a:rPr lang="en-US" sz="1100" b="1" dirty="0"/>
+                      <a:t>HOST PORT: 1522</a:t>
+                    </a:r>
+                  </a:p>
+                </p:txBody>
+              </p:sp>
+              <p:cxnSp>
+                <p:nvCxnSpPr>
+                  <p:cNvPr id="45" name="Straight Arrow Connector 44">
+                    <a:extLst>
+                      <a:ext uri="{FF2B5EF4-FFF2-40B4-BE49-F238E27FC236}">
+                        <a16:creationId xmlns:a16="http://schemas.microsoft.com/office/drawing/2014/main" id="{F002753E-81C5-4EA3-939C-071312DD97B9}"/>
+                      </a:ext>
+                    </a:extLst>
+                  </p:cNvPr>
+                  <p:cNvCxnSpPr>
+                    <a:cxnSpLocks/>
+                  </p:cNvCxnSpPr>
+                  <p:nvPr/>
+                </p:nvCxnSpPr>
+                <p:spPr>
+                  <a:xfrm flipH="1">
+                    <a:off x="6467312" y="5632622"/>
+                    <a:ext cx="2405547" cy="0"/>
+                  </a:xfrm>
+                  <a:prstGeom prst="straightConnector1">
+                    <a:avLst/>
+                  </a:prstGeom>
+                  <a:ln w="38100">
+                    <a:headEnd type="triangle"/>
+                    <a:tailEnd type="triangle"/>
+                  </a:ln>
+                </p:spPr>
+                <p:style>
+                  <a:lnRef idx="1">
+                    <a:schemeClr val="accent1"/>
+                  </a:lnRef>
+                  <a:fillRef idx="0">
+                    <a:schemeClr val="accent1"/>
+                  </a:fillRef>
+                  <a:effectRef idx="0">
+                    <a:schemeClr val="accent1"/>
+                  </a:effectRef>
+                  <a:fontRef idx="minor">
+                    <a:schemeClr val="tx1"/>
+                  </a:fontRef>
+                </p:style>
+              </p:cxnSp>
+              <p:sp>
+                <p:nvSpPr>
+                  <p:cNvPr id="46" name="TextBox 45">
+                    <a:extLst>
+                      <a:ext uri="{FF2B5EF4-FFF2-40B4-BE49-F238E27FC236}">
+                        <a16:creationId xmlns:a16="http://schemas.microsoft.com/office/drawing/2014/main" id="{28CDF91D-A6D8-409E-98E1-C1578857EC3F}"/>
+                      </a:ext>
+                    </a:extLst>
+                  </p:cNvPr>
+                  <p:cNvSpPr txBox="1"/>
+                  <p:nvPr/>
+                </p:nvSpPr>
+                <p:spPr>
+                  <a:xfrm>
+                    <a:off x="7963102" y="5328143"/>
+                    <a:ext cx="909757" cy="261610"/>
+                  </a:xfrm>
+                  <a:prstGeom prst="rect">
+                    <a:avLst/>
+                  </a:prstGeom>
+                  <a:noFill/>
+                </p:spPr>
+                <p:txBody>
+                  <a:bodyPr wrap="square" rtlCol="0">
+                    <a:spAutoFit/>
+                  </a:bodyPr>
+                  <a:lstStyle/>
+                  <a:p>
+                    <a:r>
+                      <a:rPr lang="en-US" sz="1100" b="1" dirty="0"/>
+                      <a:t>PORT: 1521</a:t>
+                    </a:r>
+                  </a:p>
+                </p:txBody>
+              </p:sp>
+              <p:sp>
+                <p:nvSpPr>
+                  <p:cNvPr id="47" name="TextBox 46">
+                    <a:extLst>
+                      <a:ext uri="{FF2B5EF4-FFF2-40B4-BE49-F238E27FC236}">
+                        <a16:creationId xmlns:a16="http://schemas.microsoft.com/office/drawing/2014/main" id="{D87E3848-F70E-4642-9990-13D88722EA2C}"/>
+                      </a:ext>
+                    </a:extLst>
+                  </p:cNvPr>
+                  <p:cNvSpPr txBox="1"/>
+                  <p:nvPr/>
+                </p:nvSpPr>
+                <p:spPr>
+                  <a:xfrm>
+                    <a:off x="6441371" y="5332600"/>
+                    <a:ext cx="1293354" cy="261610"/>
+                  </a:xfrm>
+                  <a:prstGeom prst="rect">
+                    <a:avLst/>
+                  </a:prstGeom>
+                  <a:noFill/>
+                </p:spPr>
+                <p:txBody>
+                  <a:bodyPr wrap="square" rtlCol="0">
+                    <a:spAutoFit/>
+                  </a:bodyPr>
+                  <a:lstStyle/>
+                  <a:p>
+                    <a:r>
+                      <a:rPr lang="en-US" sz="1100" b="1" dirty="0"/>
+                      <a:t>HOST PORT: 1523</a:t>
+                    </a:r>
+                  </a:p>
+                </p:txBody>
+              </p:sp>
+              <p:sp>
+                <p:nvSpPr>
+                  <p:cNvPr id="51" name="Arrow: Down 50">
+                    <a:extLst>
+                      <a:ext uri="{FF2B5EF4-FFF2-40B4-BE49-F238E27FC236}">
+                        <a16:creationId xmlns:a16="http://schemas.microsoft.com/office/drawing/2014/main" id="{9601F5C8-9F00-48FC-9A67-91640C6BE99C}"/>
+                      </a:ext>
+                    </a:extLst>
+                  </p:cNvPr>
+                  <p:cNvSpPr/>
+                  <p:nvPr/>
+                </p:nvSpPr>
+                <p:spPr>
+                  <a:xfrm rot="10800000">
+                    <a:off x="8965931" y="2317678"/>
+                    <a:ext cx="581383" cy="394797"/>
+                  </a:xfrm>
+                  <a:prstGeom prst="downArrow">
+                    <a:avLst/>
+                  </a:prstGeom>
+                  <a:noFill/>
+                </p:spPr>
+                <p:style>
+                  <a:lnRef idx="2">
+                    <a:schemeClr val="accent1">
+                      <a:shade val="50000"/>
+                    </a:schemeClr>
+                  </a:lnRef>
+                  <a:fillRef idx="1">
+                    <a:schemeClr val="accent1"/>
+                  </a:fillRef>
+                  <a:effectRef idx="0">
+                    <a:schemeClr val="accent1"/>
+                  </a:effectRef>
+                  <a:fontRef idx="minor">
+                    <a:schemeClr val="lt1"/>
+                  </a:fontRef>
+                </p:style>
+                <p:txBody>
+                  <a:bodyPr rtlCol="0" anchor="ctr"/>
+                  <a:lstStyle/>
+                  <a:p>
+                    <a:pPr algn="ctr"/>
+                    <a:endParaRPr lang="en-US"/>
+                  </a:p>
+                </p:txBody>
+              </p:sp>
+            </p:grpSp>
+            <p:grpSp>
+              <p:nvGrpSpPr>
+                <p:cNvPr id="61" name="Group 60">
+                  <a:extLst>
+                    <a:ext uri="{FF2B5EF4-FFF2-40B4-BE49-F238E27FC236}">
+                      <a16:creationId xmlns:a16="http://schemas.microsoft.com/office/drawing/2014/main" id="{A88B0B67-1610-4F6B-AB28-1CADFB621B92}"/>
+                    </a:ext>
+                  </a:extLst>
+                </p:cNvPr>
+                <p:cNvGrpSpPr/>
+                <p:nvPr/>
+              </p:nvGrpSpPr>
+              <p:grpSpPr>
+                <a:xfrm>
+                  <a:off x="5799529" y="2833630"/>
+                  <a:ext cx="2103479" cy="1228572"/>
+                  <a:chOff x="5799529" y="2833630"/>
+                  <a:chExt cx="2103479" cy="1228572"/>
+                </a:xfrm>
+              </p:grpSpPr>
+              <p:grpSp>
+                <p:nvGrpSpPr>
+                  <p:cNvPr id="58" name="Group 57">
+                    <a:extLst>
+                      <a:ext uri="{FF2B5EF4-FFF2-40B4-BE49-F238E27FC236}">
+                        <a16:creationId xmlns:a16="http://schemas.microsoft.com/office/drawing/2014/main" id="{79F5CE5F-1385-47BF-A4C1-004EFD0421C0}"/>
+                      </a:ext>
+                    </a:extLst>
+                  </p:cNvPr>
+                  <p:cNvGrpSpPr/>
+                  <p:nvPr/>
+                </p:nvGrpSpPr>
+                <p:grpSpPr>
+                  <a:xfrm>
+                    <a:off x="5799529" y="2833630"/>
+                    <a:ext cx="1362539" cy="1228572"/>
+                    <a:chOff x="5850935" y="2610042"/>
+                    <a:chExt cx="1362539" cy="1228572"/>
+                  </a:xfrm>
+                </p:grpSpPr>
+                <p:pic>
+                  <p:nvPicPr>
+                    <p:cNvPr id="54" name="Graphic 53" descr="Monitor">
+                      <a:extLst>
+                        <a:ext uri="{FF2B5EF4-FFF2-40B4-BE49-F238E27FC236}">
+                          <a16:creationId xmlns:a16="http://schemas.microsoft.com/office/drawing/2014/main" id="{888CFB3C-2767-4093-A8C3-24CD3729DF64}"/>
+                        </a:ext>
+                      </a:extLst>
+                    </p:cNvPr>
+                    <p:cNvPicPr>
+                      <a:picLocks noChangeAspect="1"/>
+                    </p:cNvPicPr>
+                    <p:nvPr/>
+                  </p:nvPicPr>
+                  <p:blipFill>
+                    <a:blip r:embed="rId7">
+                      <a:extLst>
+                        <a:ext uri="{28A0092B-C50C-407E-A947-70E740481C1C}">
+                          <a14:useLocalDpi xmlns:a14="http://schemas.microsoft.com/office/drawing/2010/main" val="0"/>
+                        </a:ext>
+                        <a:ext uri="{96DAC541-7B7A-43D3-8B79-37D633B846F1}">
+                          <asvg:svgBlip xmlns:asvg="http://schemas.microsoft.com/office/drawing/2016/SVG/main" r:embed="rId8"/>
+                        </a:ext>
+                      </a:extLst>
+                    </a:blip>
+                    <a:stretch>
+                      <a:fillRect/>
+                    </a:stretch>
+                  </p:blipFill>
+                  <p:spPr>
+                    <a:xfrm>
+                      <a:off x="6118371" y="2610042"/>
+                      <a:ext cx="914400" cy="914400"/>
+                    </a:xfrm>
+                    <a:prstGeom prst="rect">
+                      <a:avLst/>
+                    </a:prstGeom>
+                  </p:spPr>
+                </p:pic>
+                <p:grpSp>
+                  <p:nvGrpSpPr>
+                    <p:cNvPr id="57" name="Group 56">
+                      <a:extLst>
+                        <a:ext uri="{FF2B5EF4-FFF2-40B4-BE49-F238E27FC236}">
+                          <a16:creationId xmlns:a16="http://schemas.microsoft.com/office/drawing/2014/main" id="{C691F626-05E8-42BE-9546-A542386BF934}"/>
+                        </a:ext>
+                      </a:extLst>
+                    </p:cNvPr>
+                    <p:cNvGrpSpPr/>
+                    <p:nvPr/>
+                  </p:nvGrpSpPr>
+                  <p:grpSpPr>
+                    <a:xfrm>
+                      <a:off x="5850935" y="2837803"/>
+                      <a:ext cx="1362539" cy="1000811"/>
+                      <a:chOff x="5850935" y="2850162"/>
+                      <a:chExt cx="1362539" cy="1000811"/>
+                    </a:xfrm>
+                  </p:grpSpPr>
+                  <p:pic>
+                    <p:nvPicPr>
+                      <p:cNvPr id="55" name="Graphic 54" descr="Monitor">
+                        <a:extLst>
+                          <a:ext uri="{FF2B5EF4-FFF2-40B4-BE49-F238E27FC236}">
+                            <a16:creationId xmlns:a16="http://schemas.microsoft.com/office/drawing/2014/main" id="{D7284E1B-BBB7-483D-867E-4B015D0BF605}"/>
+                          </a:ext>
+                        </a:extLst>
+                      </p:cNvPr>
+                      <p:cNvPicPr>
+                        <a:picLocks noChangeAspect="1"/>
+                      </p:cNvPicPr>
+                      <p:nvPr/>
+                    </p:nvPicPr>
+                    <p:blipFill>
+                      <a:blip r:embed="rId7">
+                        <a:extLst>
+                          <a:ext uri="{28A0092B-C50C-407E-A947-70E740481C1C}">
+                            <a14:useLocalDpi xmlns:a14="http://schemas.microsoft.com/office/drawing/2010/main" val="0"/>
+                          </a:ext>
+                          <a:ext uri="{96DAC541-7B7A-43D3-8B79-37D633B846F1}">
+                            <asvg:svgBlip xmlns:asvg="http://schemas.microsoft.com/office/drawing/2016/SVG/main" r:embed="rId8"/>
+                          </a:ext>
+                        </a:extLst>
+                      </a:blip>
+                      <a:stretch>
+                        <a:fillRect/>
+                      </a:stretch>
+                    </p:blipFill>
+                    <p:spPr>
+                      <a:xfrm>
+                        <a:off x="6299074" y="2850162"/>
+                        <a:ext cx="914400" cy="914400"/>
+                      </a:xfrm>
+                      <a:prstGeom prst="rect">
+                        <a:avLst/>
+                      </a:prstGeom>
+                    </p:spPr>
+                  </p:pic>
+                  <p:pic>
+                    <p:nvPicPr>
+                      <p:cNvPr id="56" name="Graphic 55" descr="Monitor">
+                        <a:extLst>
+                          <a:ext uri="{FF2B5EF4-FFF2-40B4-BE49-F238E27FC236}">
+                            <a16:creationId xmlns:a16="http://schemas.microsoft.com/office/drawing/2014/main" id="{1D034C4C-DA9D-4B98-A77E-34CBE5A8CB16}"/>
+                          </a:ext>
+                        </a:extLst>
+                      </p:cNvPr>
+                      <p:cNvPicPr>
+                        <a:picLocks noChangeAspect="1"/>
+                      </p:cNvPicPr>
+                      <p:nvPr/>
+                    </p:nvPicPr>
+                    <p:blipFill>
+                      <a:blip r:embed="rId7">
+                        <a:extLst>
+                          <a:ext uri="{28A0092B-C50C-407E-A947-70E740481C1C}">
+                            <a14:useLocalDpi xmlns:a14="http://schemas.microsoft.com/office/drawing/2010/main" val="0"/>
+                          </a:ext>
+                          <a:ext uri="{96DAC541-7B7A-43D3-8B79-37D633B846F1}">
+                            <asvg:svgBlip xmlns:asvg="http://schemas.microsoft.com/office/drawing/2016/SVG/main" r:embed="rId8"/>
+                          </a:ext>
+                        </a:extLst>
+                      </a:blip>
+                      <a:stretch>
+                        <a:fillRect/>
+                      </a:stretch>
+                    </p:blipFill>
+                    <p:spPr>
+                      <a:xfrm>
+                        <a:off x="5850935" y="2936573"/>
+                        <a:ext cx="914400" cy="914400"/>
+                      </a:xfrm>
+                      <a:prstGeom prst="rect">
+                        <a:avLst/>
+                      </a:prstGeom>
+                    </p:spPr>
+                  </p:pic>
+                </p:grpSp>
+              </p:grpSp>
+              <p:sp>
+                <p:nvSpPr>
+                  <p:cNvPr id="59" name="Arrow: Left-Right 58">
+                    <a:extLst>
+                      <a:ext uri="{FF2B5EF4-FFF2-40B4-BE49-F238E27FC236}">
+                        <a16:creationId xmlns:a16="http://schemas.microsoft.com/office/drawing/2014/main" id="{75E55523-A208-4EC2-8F5F-06D6CAFDD6CC}"/>
+                      </a:ext>
+                    </a:extLst>
+                  </p:cNvPr>
+                  <p:cNvSpPr/>
+                  <p:nvPr/>
+                </p:nvSpPr>
+                <p:spPr>
+                  <a:xfrm>
+                    <a:off x="7158081" y="3355615"/>
+                    <a:ext cx="744927" cy="261610"/>
+                  </a:xfrm>
+                  <a:prstGeom prst="leftRightArrow">
+                    <a:avLst/>
+                  </a:prstGeom>
+                </p:spPr>
+                <p:style>
+                  <a:lnRef idx="2">
+                    <a:schemeClr val="accent1">
+                      <a:shade val="50000"/>
+                    </a:schemeClr>
+                  </a:lnRef>
+                  <a:fillRef idx="1">
+                    <a:schemeClr val="accent1"/>
+                  </a:fillRef>
+                  <a:effectRef idx="0">
+                    <a:schemeClr val="accent1"/>
+                  </a:effectRef>
+                  <a:fontRef idx="minor">
+                    <a:schemeClr val="lt1"/>
+                  </a:fontRef>
+                </p:style>
+                <p:txBody>
+                  <a:bodyPr rtlCol="0" anchor="ctr"/>
+                  <a:lstStyle/>
+                  <a:p>
+                    <a:pPr algn="ctr"/>
+                    <a:endParaRPr lang="en-US"/>
+                  </a:p>
+                </p:txBody>
+              </p:sp>
+            </p:grpSp>
+            <p:grpSp>
+              <p:nvGrpSpPr>
+                <p:cNvPr id="62" name="Group 61">
+                  <a:extLst>
+                    <a:ext uri="{FF2B5EF4-FFF2-40B4-BE49-F238E27FC236}">
+                      <a16:creationId xmlns:a16="http://schemas.microsoft.com/office/drawing/2014/main" id="{31EE9130-A67B-4338-8316-621B50F90822}"/>
+                    </a:ext>
+                  </a:extLst>
+                </p:cNvPr>
+                <p:cNvGrpSpPr/>
+                <p:nvPr/>
+              </p:nvGrpSpPr>
+              <p:grpSpPr>
+                <a:xfrm>
+                  <a:off x="5802466" y="3906225"/>
+                  <a:ext cx="2103479" cy="1228572"/>
+                  <a:chOff x="5799529" y="2833630"/>
+                  <a:chExt cx="2103479" cy="1228572"/>
+                </a:xfrm>
+              </p:grpSpPr>
+              <p:grpSp>
+                <p:nvGrpSpPr>
+                  <p:cNvPr id="63" name="Group 62">
+                    <a:extLst>
+                      <a:ext uri="{FF2B5EF4-FFF2-40B4-BE49-F238E27FC236}">
+                        <a16:creationId xmlns:a16="http://schemas.microsoft.com/office/drawing/2014/main" id="{2BE5D226-978C-4F35-9E43-E507373851DA}"/>
+                      </a:ext>
+                    </a:extLst>
+                  </p:cNvPr>
+                  <p:cNvGrpSpPr/>
+                  <p:nvPr/>
+                </p:nvGrpSpPr>
+                <p:grpSpPr>
+                  <a:xfrm>
+                    <a:off x="5799529" y="2833630"/>
+                    <a:ext cx="1362539" cy="1228572"/>
+                    <a:chOff x="5850935" y="2610042"/>
+                    <a:chExt cx="1362539" cy="1228572"/>
+                  </a:xfrm>
+                </p:grpSpPr>
+                <p:pic>
+                  <p:nvPicPr>
+                    <p:cNvPr id="65" name="Graphic 64" descr="Monitor">
+                      <a:extLst>
+                        <a:ext uri="{FF2B5EF4-FFF2-40B4-BE49-F238E27FC236}">
+                          <a16:creationId xmlns:a16="http://schemas.microsoft.com/office/drawing/2014/main" id="{A9584507-D54E-4F98-B77F-33D13282C45E}"/>
+                        </a:ext>
+                      </a:extLst>
+                    </p:cNvPr>
+                    <p:cNvPicPr>
+                      <a:picLocks noChangeAspect="1"/>
+                    </p:cNvPicPr>
+                    <p:nvPr/>
+                  </p:nvPicPr>
+                  <p:blipFill>
+                    <a:blip r:embed="rId7">
+                      <a:extLst>
+                        <a:ext uri="{28A0092B-C50C-407E-A947-70E740481C1C}">
+                          <a14:useLocalDpi xmlns:a14="http://schemas.microsoft.com/office/drawing/2010/main" val="0"/>
+                        </a:ext>
+                        <a:ext uri="{96DAC541-7B7A-43D3-8B79-37D633B846F1}">
+                          <asvg:svgBlip xmlns:asvg="http://schemas.microsoft.com/office/drawing/2016/SVG/main" r:embed="rId8"/>
+                        </a:ext>
+                      </a:extLst>
+                    </a:blip>
+                    <a:stretch>
+                      <a:fillRect/>
+                    </a:stretch>
+                  </p:blipFill>
+                  <p:spPr>
+                    <a:xfrm>
+                      <a:off x="6118371" y="2610042"/>
+                      <a:ext cx="914400" cy="914400"/>
+                    </a:xfrm>
+                    <a:prstGeom prst="rect">
+                      <a:avLst/>
+                    </a:prstGeom>
+                  </p:spPr>
+                </p:pic>
+                <p:grpSp>
+                  <p:nvGrpSpPr>
+                    <p:cNvPr id="66" name="Group 65">
+                      <a:extLst>
+                        <a:ext uri="{FF2B5EF4-FFF2-40B4-BE49-F238E27FC236}">
+                          <a16:creationId xmlns:a16="http://schemas.microsoft.com/office/drawing/2014/main" id="{2AC5DAFA-4BA6-4D7D-BAF3-C99EE748DCAC}"/>
+                        </a:ext>
+                      </a:extLst>
+                    </p:cNvPr>
+                    <p:cNvGrpSpPr/>
+                    <p:nvPr/>
+                  </p:nvGrpSpPr>
+                  <p:grpSpPr>
+                    <a:xfrm>
+                      <a:off x="5850935" y="2837803"/>
+                      <a:ext cx="1362539" cy="1000811"/>
+                      <a:chOff x="5850935" y="2850162"/>
+                      <a:chExt cx="1362539" cy="1000811"/>
+                    </a:xfrm>
+                  </p:grpSpPr>
+                  <p:pic>
+                    <p:nvPicPr>
+                      <p:cNvPr id="67" name="Graphic 66" descr="Monitor">
+                        <a:extLst>
+                          <a:ext uri="{FF2B5EF4-FFF2-40B4-BE49-F238E27FC236}">
+                            <a16:creationId xmlns:a16="http://schemas.microsoft.com/office/drawing/2014/main" id="{3A451442-A720-4A0F-9613-6022C6DCF0CC}"/>
+                          </a:ext>
+                        </a:extLst>
+                      </p:cNvPr>
+                      <p:cNvPicPr>
+                        <a:picLocks noChangeAspect="1"/>
+                      </p:cNvPicPr>
+                      <p:nvPr/>
+                    </p:nvPicPr>
+                    <p:blipFill>
+                      <a:blip r:embed="rId7">
+                        <a:extLst>
+                          <a:ext uri="{28A0092B-C50C-407E-A947-70E740481C1C}">
+                            <a14:useLocalDpi xmlns:a14="http://schemas.microsoft.com/office/drawing/2010/main" val="0"/>
+                          </a:ext>
+                          <a:ext uri="{96DAC541-7B7A-43D3-8B79-37D633B846F1}">
+                            <asvg:svgBlip xmlns:asvg="http://schemas.microsoft.com/office/drawing/2016/SVG/main" r:embed="rId8"/>
+                          </a:ext>
+                        </a:extLst>
+                      </a:blip>
+                      <a:stretch>
+                        <a:fillRect/>
+                      </a:stretch>
+                    </p:blipFill>
+                    <p:spPr>
+                      <a:xfrm>
+                        <a:off x="6299074" y="2850162"/>
+                        <a:ext cx="914400" cy="914400"/>
+                      </a:xfrm>
+                      <a:prstGeom prst="rect">
+                        <a:avLst/>
+                      </a:prstGeom>
+                    </p:spPr>
+                  </p:pic>
+                  <p:pic>
+                    <p:nvPicPr>
+                      <p:cNvPr id="68" name="Graphic 67" descr="Monitor">
+                        <a:extLst>
+                          <a:ext uri="{FF2B5EF4-FFF2-40B4-BE49-F238E27FC236}">
+                            <a16:creationId xmlns:a16="http://schemas.microsoft.com/office/drawing/2014/main" id="{6CDBCDEB-679A-44E2-AB39-E82E78DCD2B9}"/>
+                          </a:ext>
+                        </a:extLst>
+                      </p:cNvPr>
+                      <p:cNvPicPr>
+                        <a:picLocks noChangeAspect="1"/>
+                      </p:cNvPicPr>
+                      <p:nvPr/>
+                    </p:nvPicPr>
+                    <p:blipFill>
+                      <a:blip r:embed="rId7">
+                        <a:extLst>
+                          <a:ext uri="{28A0092B-C50C-407E-A947-70E740481C1C}">
+                            <a14:useLocalDpi xmlns:a14="http://schemas.microsoft.com/office/drawing/2010/main" val="0"/>
+                          </a:ext>
+                          <a:ext uri="{96DAC541-7B7A-43D3-8B79-37D633B846F1}">
+                            <asvg:svgBlip xmlns:asvg="http://schemas.microsoft.com/office/drawing/2016/SVG/main" r:embed="rId8"/>
+                          </a:ext>
+                        </a:extLst>
+                      </a:blip>
+                      <a:stretch>
+                        <a:fillRect/>
+                      </a:stretch>
+                    </p:blipFill>
+                    <p:spPr>
+                      <a:xfrm>
+                        <a:off x="5850935" y="2936573"/>
+                        <a:ext cx="914400" cy="914400"/>
+                      </a:xfrm>
+                      <a:prstGeom prst="rect">
+                        <a:avLst/>
+                      </a:prstGeom>
+                    </p:spPr>
+                  </p:pic>
+                </p:grpSp>
+              </p:grpSp>
+              <p:sp>
+                <p:nvSpPr>
+                  <p:cNvPr id="64" name="Arrow: Left-Right 63">
+                    <a:extLst>
+                      <a:ext uri="{FF2B5EF4-FFF2-40B4-BE49-F238E27FC236}">
+                        <a16:creationId xmlns:a16="http://schemas.microsoft.com/office/drawing/2014/main" id="{EF3CC2FD-AD13-4F7B-A33B-C857AF1EBF1B}"/>
+                      </a:ext>
+                    </a:extLst>
+                  </p:cNvPr>
+                  <p:cNvSpPr/>
+                  <p:nvPr/>
+                </p:nvSpPr>
+                <p:spPr>
+                  <a:xfrm>
+                    <a:off x="7158081" y="3355615"/>
+                    <a:ext cx="744927" cy="261610"/>
+                  </a:xfrm>
+                  <a:prstGeom prst="leftRightArrow">
+                    <a:avLst/>
+                  </a:prstGeom>
+                </p:spPr>
+                <p:style>
+                  <a:lnRef idx="2">
+                    <a:schemeClr val="accent1">
+                      <a:shade val="50000"/>
+                    </a:schemeClr>
+                  </a:lnRef>
+                  <a:fillRef idx="1">
+                    <a:schemeClr val="accent1"/>
+                  </a:fillRef>
+                  <a:effectRef idx="0">
+                    <a:schemeClr val="accent1"/>
+                  </a:effectRef>
+                  <a:fontRef idx="minor">
+                    <a:schemeClr val="lt1"/>
+                  </a:fontRef>
+                </p:style>
+                <p:txBody>
+                  <a:bodyPr rtlCol="0" anchor="ctr"/>
+                  <a:lstStyle/>
+                  <a:p>
+                    <a:pPr algn="ctr"/>
+                    <a:endParaRPr lang="en-US"/>
+                  </a:p>
+                </p:txBody>
+              </p:sp>
+            </p:grpSp>
+            <p:grpSp>
+              <p:nvGrpSpPr>
+                <p:cNvPr id="69" name="Group 68">
+                  <a:extLst>
+                    <a:ext uri="{FF2B5EF4-FFF2-40B4-BE49-F238E27FC236}">
+                      <a16:creationId xmlns:a16="http://schemas.microsoft.com/office/drawing/2014/main" id="{093B6DB4-EC54-4C95-87B1-3515F579A730}"/>
+                    </a:ext>
+                  </a:extLst>
+                </p:cNvPr>
+                <p:cNvGrpSpPr/>
+                <p:nvPr/>
+              </p:nvGrpSpPr>
+              <p:grpSpPr>
+                <a:xfrm>
+                  <a:off x="5793921" y="5015763"/>
+                  <a:ext cx="2103479" cy="1228572"/>
+                  <a:chOff x="5799529" y="2833630"/>
+                  <a:chExt cx="2103479" cy="1228572"/>
+                </a:xfrm>
+              </p:grpSpPr>
+              <p:grpSp>
+                <p:nvGrpSpPr>
+                  <p:cNvPr id="70" name="Group 69">
+                    <a:extLst>
+                      <a:ext uri="{FF2B5EF4-FFF2-40B4-BE49-F238E27FC236}">
+                        <a16:creationId xmlns:a16="http://schemas.microsoft.com/office/drawing/2014/main" id="{539CEEC3-6FD1-49D8-AD64-09EC950A1E7B}"/>
+                      </a:ext>
+                    </a:extLst>
+                  </p:cNvPr>
+                  <p:cNvGrpSpPr/>
+                  <p:nvPr/>
+                </p:nvGrpSpPr>
+                <p:grpSpPr>
+                  <a:xfrm>
+                    <a:off x="5799529" y="2833630"/>
+                    <a:ext cx="1362539" cy="1228572"/>
+                    <a:chOff x="5850935" y="2610042"/>
+                    <a:chExt cx="1362539" cy="1228572"/>
+                  </a:xfrm>
+                </p:grpSpPr>
+                <p:pic>
+                  <p:nvPicPr>
+                    <p:cNvPr id="72" name="Graphic 71" descr="Monitor">
+                      <a:extLst>
+                        <a:ext uri="{FF2B5EF4-FFF2-40B4-BE49-F238E27FC236}">
+                          <a16:creationId xmlns:a16="http://schemas.microsoft.com/office/drawing/2014/main" id="{C6AD39A0-A9F3-4CC3-AA10-653E232BA275}"/>
+                        </a:ext>
+                      </a:extLst>
+                    </p:cNvPr>
+                    <p:cNvPicPr>
+                      <a:picLocks noChangeAspect="1"/>
+                    </p:cNvPicPr>
+                    <p:nvPr/>
+                  </p:nvPicPr>
+                  <p:blipFill>
+                    <a:blip r:embed="rId7">
+                      <a:extLst>
+                        <a:ext uri="{28A0092B-C50C-407E-A947-70E740481C1C}">
+                          <a14:useLocalDpi xmlns:a14="http://schemas.microsoft.com/office/drawing/2010/main" val="0"/>
+                        </a:ext>
+                        <a:ext uri="{96DAC541-7B7A-43D3-8B79-37D633B846F1}">
+                          <asvg:svgBlip xmlns:asvg="http://schemas.microsoft.com/office/drawing/2016/SVG/main" r:embed="rId8"/>
+                        </a:ext>
+                      </a:extLst>
+                    </a:blip>
+                    <a:stretch>
+                      <a:fillRect/>
+                    </a:stretch>
+                  </p:blipFill>
+                  <p:spPr>
+                    <a:xfrm>
+                      <a:off x="6118371" y="2610042"/>
+                      <a:ext cx="914400" cy="914400"/>
+                    </a:xfrm>
+                    <a:prstGeom prst="rect">
+                      <a:avLst/>
+                    </a:prstGeom>
+                  </p:spPr>
+                </p:pic>
+                <p:grpSp>
+                  <p:nvGrpSpPr>
+                    <p:cNvPr id="73" name="Group 72">
+                      <a:extLst>
+                        <a:ext uri="{FF2B5EF4-FFF2-40B4-BE49-F238E27FC236}">
+                          <a16:creationId xmlns:a16="http://schemas.microsoft.com/office/drawing/2014/main" id="{5BF1CB65-BD09-474B-9B1F-8A887918C93F}"/>
+                        </a:ext>
+                      </a:extLst>
+                    </p:cNvPr>
+                    <p:cNvGrpSpPr/>
+                    <p:nvPr/>
+                  </p:nvGrpSpPr>
+                  <p:grpSpPr>
+                    <a:xfrm>
+                      <a:off x="5850935" y="2837803"/>
+                      <a:ext cx="1362539" cy="1000811"/>
+                      <a:chOff x="5850935" y="2850162"/>
+                      <a:chExt cx="1362539" cy="1000811"/>
+                    </a:xfrm>
+                  </p:grpSpPr>
+                  <p:pic>
+                    <p:nvPicPr>
+                      <p:cNvPr id="74" name="Graphic 73" descr="Monitor">
+                        <a:extLst>
+                          <a:ext uri="{FF2B5EF4-FFF2-40B4-BE49-F238E27FC236}">
+                            <a16:creationId xmlns:a16="http://schemas.microsoft.com/office/drawing/2014/main" id="{D763EFC3-637D-4AE6-94B0-3F82D2007892}"/>
+                          </a:ext>
+                        </a:extLst>
+                      </p:cNvPr>
+                      <p:cNvPicPr>
+                        <a:picLocks noChangeAspect="1"/>
+                      </p:cNvPicPr>
+                      <p:nvPr/>
+                    </p:nvPicPr>
+                    <p:blipFill>
+                      <a:blip r:embed="rId7">
+                        <a:extLst>
+                          <a:ext uri="{28A0092B-C50C-407E-A947-70E740481C1C}">
+                            <a14:useLocalDpi xmlns:a14="http://schemas.microsoft.com/office/drawing/2010/main" val="0"/>
+                          </a:ext>
+                          <a:ext uri="{96DAC541-7B7A-43D3-8B79-37D633B846F1}">
+                            <asvg:svgBlip xmlns:asvg="http://schemas.microsoft.com/office/drawing/2016/SVG/main" r:embed="rId8"/>
+                          </a:ext>
+                        </a:extLst>
+                      </a:blip>
+                      <a:stretch>
+                        <a:fillRect/>
+                      </a:stretch>
+                    </p:blipFill>
+                    <p:spPr>
+                      <a:xfrm>
+                        <a:off x="6299074" y="2850162"/>
+                        <a:ext cx="914400" cy="914400"/>
+                      </a:xfrm>
+                      <a:prstGeom prst="rect">
+                        <a:avLst/>
+                      </a:prstGeom>
+                    </p:spPr>
+                  </p:pic>
+                  <p:pic>
+                    <p:nvPicPr>
+                      <p:cNvPr id="75" name="Graphic 74" descr="Monitor">
+                        <a:extLst>
+                          <a:ext uri="{FF2B5EF4-FFF2-40B4-BE49-F238E27FC236}">
+                            <a16:creationId xmlns:a16="http://schemas.microsoft.com/office/drawing/2014/main" id="{E05008DA-2019-4A67-850D-0D855AEEE8AA}"/>
+                          </a:ext>
+                        </a:extLst>
+                      </p:cNvPr>
+                      <p:cNvPicPr>
+                        <a:picLocks noChangeAspect="1"/>
+                      </p:cNvPicPr>
+                      <p:nvPr/>
+                    </p:nvPicPr>
+                    <p:blipFill>
+                      <a:blip r:embed="rId7">
+                        <a:extLst>
+                          <a:ext uri="{28A0092B-C50C-407E-A947-70E740481C1C}">
+                            <a14:useLocalDpi xmlns:a14="http://schemas.microsoft.com/office/drawing/2010/main" val="0"/>
+                          </a:ext>
+                          <a:ext uri="{96DAC541-7B7A-43D3-8B79-37D633B846F1}">
+                            <asvg:svgBlip xmlns:asvg="http://schemas.microsoft.com/office/drawing/2016/SVG/main" r:embed="rId8"/>
+                          </a:ext>
+                        </a:extLst>
+                      </a:blip>
+                      <a:stretch>
+                        <a:fillRect/>
+                      </a:stretch>
+                    </p:blipFill>
+                    <p:spPr>
+                      <a:xfrm>
+                        <a:off x="5850935" y="2936573"/>
+                        <a:ext cx="914400" cy="914400"/>
+                      </a:xfrm>
+                      <a:prstGeom prst="rect">
+                        <a:avLst/>
+                      </a:prstGeom>
+                    </p:spPr>
+                  </p:pic>
+                </p:grpSp>
+              </p:grpSp>
+              <p:sp>
+                <p:nvSpPr>
+                  <p:cNvPr id="71" name="Arrow: Left-Right 70">
+                    <a:extLst>
+                      <a:ext uri="{FF2B5EF4-FFF2-40B4-BE49-F238E27FC236}">
+                        <a16:creationId xmlns:a16="http://schemas.microsoft.com/office/drawing/2014/main" id="{B95304B6-A473-448A-B846-02B998006632}"/>
+                      </a:ext>
+                    </a:extLst>
+                  </p:cNvPr>
+                  <p:cNvSpPr/>
+                  <p:nvPr/>
+                </p:nvSpPr>
+                <p:spPr>
+                  <a:xfrm>
+                    <a:off x="7158081" y="3355615"/>
+                    <a:ext cx="744927" cy="261610"/>
+                  </a:xfrm>
+                  <a:prstGeom prst="leftRightArrow">
+                    <a:avLst/>
+                  </a:prstGeom>
+                </p:spPr>
+                <p:style>
+                  <a:lnRef idx="2">
+                    <a:schemeClr val="accent1">
+                      <a:shade val="50000"/>
+                    </a:schemeClr>
+                  </a:lnRef>
+                  <a:fillRef idx="1">
+                    <a:schemeClr val="accent1"/>
+                  </a:fillRef>
+                  <a:effectRef idx="0">
+                    <a:schemeClr val="accent1"/>
+                  </a:effectRef>
+                  <a:fontRef idx="minor">
+                    <a:schemeClr val="lt1"/>
+                  </a:fontRef>
+                </p:style>
+                <p:txBody>
+                  <a:bodyPr rtlCol="0" anchor="ctr"/>
+                  <a:lstStyle/>
+                  <a:p>
+                    <a:pPr algn="ctr"/>
+                    <a:endParaRPr lang="en-US"/>
+                  </a:p>
+                </p:txBody>
+              </p:sp>
+            </p:grpSp>
+            <p:sp>
+              <p:nvSpPr>
+                <p:cNvPr id="76" name="TextBox 75">
+                  <a:extLst>
+                    <a:ext uri="{FF2B5EF4-FFF2-40B4-BE49-F238E27FC236}">
+                      <a16:creationId xmlns:a16="http://schemas.microsoft.com/office/drawing/2014/main" id="{15EE640F-7023-4092-8648-3F6FE941C75B}"/>
+                    </a:ext>
+                  </a:extLst>
+                </p:cNvPr>
+                <p:cNvSpPr txBox="1"/>
+                <p:nvPr/>
+              </p:nvSpPr>
+              <p:spPr>
+                <a:xfrm>
+                  <a:off x="7857015" y="2315133"/>
+                  <a:ext cx="2316064" cy="261610"/>
+                </a:xfrm>
+                <a:prstGeom prst="rect">
+                  <a:avLst/>
+                </a:prstGeom>
+                <a:noFill/>
+              </p:spPr>
+              <p:txBody>
+                <a:bodyPr wrap="square" rtlCol="0">
+                  <a:spAutoFit/>
+                </a:bodyPr>
+                <a:lstStyle/>
+                <a:p>
+                  <a:r>
+                    <a:rPr lang="en-US" sz="1100" b="1" dirty="0"/>
+                    <a:t>Run Db Containers From Image</a:t>
+                  </a:r>
+                </a:p>
+              </p:txBody>
+            </p:sp>
+            <p:pic>
+              <p:nvPicPr>
+                <p:cNvPr id="79" name="Graphic 78" descr="Document">
+                  <a:extLst>
+                    <a:ext uri="{FF2B5EF4-FFF2-40B4-BE49-F238E27FC236}">
+                      <a16:creationId xmlns:a16="http://schemas.microsoft.com/office/drawing/2014/main" id="{62AD6978-110D-4693-BC20-728EA03A2B84}"/>
+                    </a:ext>
+                  </a:extLst>
+                </p:cNvPr>
+                <p:cNvPicPr>
+                  <a:picLocks noChangeAspect="1"/>
+                </p:cNvPicPr>
+                <p:nvPr/>
+              </p:nvPicPr>
+              <p:blipFill>
+                <a:blip r:embed="rId9">
+                  <a:extLst>
+                    <a:ext uri="{28A0092B-C50C-407E-A947-70E740481C1C}">
+                      <a14:useLocalDpi xmlns:a14="http://schemas.microsoft.com/office/drawing/2010/main" val="0"/>
+                    </a:ext>
+                    <a:ext uri="{96DAC541-7B7A-43D3-8B79-37D633B846F1}">
+                      <asvg:svgBlip xmlns:asvg="http://schemas.microsoft.com/office/drawing/2016/SVG/main" r:embed="rId10"/>
+                    </a:ext>
+                  </a:extLst>
+                </a:blip>
+                <a:stretch>
+                  <a:fillRect/>
+                </a:stretch>
+              </p:blipFill>
+              <p:spPr>
+                <a:xfrm>
+                  <a:off x="6203711" y="305831"/>
+                  <a:ext cx="694439" cy="694439"/>
+                </a:xfrm>
+                <a:prstGeom prst="rect">
+                  <a:avLst/>
+                </a:prstGeom>
+              </p:spPr>
+            </p:pic>
+            <p:sp>
+              <p:nvSpPr>
+                <p:cNvPr id="80" name="TextBox 79">
+                  <a:extLst>
+                    <a:ext uri="{FF2B5EF4-FFF2-40B4-BE49-F238E27FC236}">
+                      <a16:creationId xmlns:a16="http://schemas.microsoft.com/office/drawing/2014/main" id="{4AC22A26-B5F9-4195-9C76-617BF8785EB2}"/>
+                    </a:ext>
+                  </a:extLst>
+                </p:cNvPr>
+                <p:cNvSpPr txBox="1"/>
+                <p:nvPr/>
+              </p:nvSpPr>
+              <p:spPr>
+                <a:xfrm>
+                  <a:off x="6836365" y="441183"/>
+                  <a:ext cx="920364" cy="253916"/>
+                </a:xfrm>
+                <a:prstGeom prst="rect">
+                  <a:avLst/>
+                </a:prstGeom>
+                <a:noFill/>
+              </p:spPr>
+              <p:txBody>
+                <a:bodyPr wrap="square" rtlCol="0">
+                  <a:spAutoFit/>
+                </a:bodyPr>
+                <a:lstStyle/>
+                <a:p>
+                  <a:r>
+                    <a:rPr lang="en-US" sz="1050" b="1" dirty="0" err="1"/>
+                    <a:t>Dockerfile</a:t>
+                  </a:r>
+                  <a:endParaRPr lang="en-US" sz="1050" b="1" dirty="0"/>
+                </a:p>
+              </p:txBody>
+            </p:sp>
+            <p:cxnSp>
+              <p:nvCxnSpPr>
+                <p:cNvPr id="82" name="Straight Arrow Connector 81">
+                  <a:extLst>
+                    <a:ext uri="{FF2B5EF4-FFF2-40B4-BE49-F238E27FC236}">
+                      <a16:creationId xmlns:a16="http://schemas.microsoft.com/office/drawing/2014/main" id="{7F59A658-3C29-4D58-945C-BB77FB3B1E3B}"/>
+                    </a:ext>
+                  </a:extLst>
+                </p:cNvPr>
+                <p:cNvCxnSpPr>
+                  <a:cxnSpLocks/>
+                </p:cNvCxnSpPr>
+                <p:nvPr/>
+              </p:nvCxnSpPr>
+              <p:spPr>
+                <a:xfrm flipH="1" flipV="1">
+                  <a:off x="6716867" y="741406"/>
+                  <a:ext cx="4337987" cy="26265"/>
+                </a:xfrm>
+                <a:prstGeom prst="straightConnector1">
+                  <a:avLst/>
+                </a:prstGeom>
+                <a:ln w="38100">
+                  <a:tailEnd type="triangle"/>
+                </a:ln>
+              </p:spPr>
+              <p:style>
+                <a:lnRef idx="1">
+                  <a:schemeClr val="accent1"/>
+                </a:lnRef>
+                <a:fillRef idx="0">
+                  <a:schemeClr val="accent1"/>
+                </a:fillRef>
+                <a:effectRef idx="0">
+                  <a:schemeClr val="accent1"/>
+                </a:effectRef>
+                <a:fontRef idx="minor">
+                  <a:schemeClr val="tx1"/>
+                </a:fontRef>
+              </p:style>
+            </p:cxnSp>
+            <p:cxnSp>
+              <p:nvCxnSpPr>
+                <p:cNvPr id="87" name="Connector: Elbow 86">
+                  <a:extLst>
+                    <a:ext uri="{FF2B5EF4-FFF2-40B4-BE49-F238E27FC236}">
+                      <a16:creationId xmlns:a16="http://schemas.microsoft.com/office/drawing/2014/main" id="{8A08A658-72FE-40EA-AB5B-743696C369F9}"/>
+                    </a:ext>
+                  </a:extLst>
+                </p:cNvPr>
+                <p:cNvCxnSpPr>
+                  <a:cxnSpLocks/>
+                </p:cNvCxnSpPr>
+                <p:nvPr/>
+              </p:nvCxnSpPr>
+              <p:spPr>
+                <a:xfrm>
+                  <a:off x="6563288" y="950842"/>
+                  <a:ext cx="1670444" cy="642413"/>
+                </a:xfrm>
+                <a:prstGeom prst="bentConnector3">
+                  <a:avLst>
+                    <a:gd name="adj1" fmla="val -302"/>
+                  </a:avLst>
+                </a:prstGeom>
+                <a:ln w="38100">
+                  <a:tailEnd type="triangle"/>
+                </a:ln>
+              </p:spPr>
+              <p:style>
+                <a:lnRef idx="1">
+                  <a:schemeClr val="accent1"/>
+                </a:lnRef>
+                <a:fillRef idx="0">
+                  <a:schemeClr val="accent1"/>
+                </a:fillRef>
+                <a:effectRef idx="0">
+                  <a:schemeClr val="accent1"/>
+                </a:effectRef>
+                <a:fontRef idx="minor">
+                  <a:schemeClr val="tx1"/>
+                </a:fontRef>
+              </p:style>
+            </p:cxnSp>
+            <p:sp>
+              <p:nvSpPr>
+                <p:cNvPr id="91" name="TextBox 90">
+                  <a:extLst>
+                    <a:ext uri="{FF2B5EF4-FFF2-40B4-BE49-F238E27FC236}">
+                      <a16:creationId xmlns:a16="http://schemas.microsoft.com/office/drawing/2014/main" id="{A5A5FF77-F417-4259-9A51-0815E81C6D34}"/>
+                    </a:ext>
+                  </a:extLst>
+                </p:cNvPr>
+                <p:cNvSpPr txBox="1"/>
+                <p:nvPr/>
+              </p:nvSpPr>
+              <p:spPr>
+                <a:xfrm>
+                  <a:off x="6518557" y="1642591"/>
+                  <a:ext cx="1553019" cy="261610"/>
+                </a:xfrm>
+                <a:prstGeom prst="rect">
+                  <a:avLst/>
+                </a:prstGeom>
+                <a:noFill/>
+              </p:spPr>
+              <p:txBody>
+                <a:bodyPr wrap="square" rtlCol="0">
+                  <a:spAutoFit/>
+                </a:bodyPr>
+                <a:lstStyle/>
+                <a:p>
+                  <a:r>
+                    <a:rPr lang="en-US" sz="1100" b="1" dirty="0"/>
+                    <a:t>Customized Image</a:t>
+                  </a:r>
+                </a:p>
+              </p:txBody>
+            </p:sp>
+          </p:grpSp>
+        </p:grpSp>
+      </p:grpSp>
+      <p:sp>
+        <p:nvSpPr>
+          <p:cNvPr id="98" name="TextBox 97">
+            <a:extLst>
+              <a:ext uri="{FF2B5EF4-FFF2-40B4-BE49-F238E27FC236}">
+                <a16:creationId xmlns:a16="http://schemas.microsoft.com/office/drawing/2014/main" id="{D7A45887-EC27-406B-9796-5B4857BAE707}"/>
+              </a:ext>
+            </a:extLst>
+          </p:cNvPr>
+          <p:cNvSpPr txBox="1"/>
+          <p:nvPr/>
+        </p:nvSpPr>
+        <p:spPr>
+          <a:xfrm>
+            <a:off x="405839" y="1970611"/>
+            <a:ext cx="5150495" cy="2031325"/>
+          </a:xfrm>
+          <a:prstGeom prst="rect">
+            <a:avLst/>
+          </a:prstGeom>
+          <a:noFill/>
+        </p:spPr>
+        <p:txBody>
+          <a:bodyPr wrap="square" rtlCol="0">
+            <a:spAutoFit/>
+          </a:bodyPr>
+          <a:lstStyle/>
+          <a:p>
+            <a:r>
+              <a:rPr lang="en-US" dirty="0"/>
+              <a:t>Based on Oracle 12.1 Slim image</a:t>
+            </a:r>
+          </a:p>
+          <a:p>
+            <a:endParaRPr lang="en-US" dirty="0"/>
+          </a:p>
+          <a:p>
+            <a:r>
+              <a:rPr lang="en-US" dirty="0"/>
+              <a:t>Fast Container/DB Spin-up</a:t>
+            </a:r>
+          </a:p>
+          <a:p>
+            <a:endParaRPr lang="en-US" dirty="0"/>
+          </a:p>
+          <a:p>
+            <a:r>
+              <a:rPr lang="en-US" dirty="0"/>
+              <a:t>Database as Scratch Pads for Quick Testing</a:t>
+            </a:r>
+          </a:p>
+          <a:p>
+            <a:endParaRPr lang="en-US" dirty="0"/>
+          </a:p>
+          <a:p>
+            <a:r>
+              <a:rPr lang="en-US" dirty="0"/>
+              <a:t>Re-Publish images from Container States</a:t>
+            </a:r>
+          </a:p>
+        </p:txBody>
+      </p:sp>
+    </p:spTree>
+    <p:extLst>
+      <p:ext uri="{BB962C8B-B14F-4D97-AF65-F5344CB8AC3E}">
+        <p14:creationId xmlns:p14="http://schemas.microsoft.com/office/powerpoint/2010/main" val="223379164"/>
+      </p:ext>
+    </p:extLst>
+  </p:cSld>
+  <p:clrMapOvr>
+    <a:masterClrMapping/>
+  </p:clrMapOvr>
+</p:sld>
+</file>
+
 <file path=ppt/slides/slide3.xml><?xml version="1.0" encoding="utf-8"?>
 <p:sld xmlns:a="http://schemas.openxmlformats.org/drawingml/2006/main" xmlns:r="http://schemas.openxmlformats.org/officeDocument/2006/relationships" xmlns:p="http://schemas.openxmlformats.org/presentationml/2006/main">
   <p:cSld>
@@ -17945,12 +20270,7 @@
             <p:ph type="title"/>
           </p:nvPr>
         </p:nvSpPr>
-        <p:spPr>
-          <a:xfrm>
-            <a:off x="646111" y="452718"/>
-            <a:ext cx="9404723" cy="1400530"/>
-          </a:xfrm>
-        </p:spPr>
+        <p:spPr/>
         <p:txBody>
           <a:bodyPr/>
           <a:lstStyle/>

</xml_diff>